<commit_message>
proyecto finalizado !!! creada documentacion y presentacion para el proyecto. FIN DE CURSO DAM.
</commit_message>
<xml_diff>
--- a/fin_de_curso/PresentationProyecto.pptx
+++ b/fin_de_curso/PresentationProyecto.pptx
@@ -2341,7 +2341,7 @@
           <a:p>
             <a:fld id="{46C3C946-1CE1-438B-BEE3-0CD0F6A14CF5}" type="datetimeFigureOut">
               <a:rPr lang="en-US" smtClean="0"/>
-              <a:t>15-Dec-19</a:t>
+              <a:t>17-Dec-19</a:t>
             </a:fld>
             <a:endParaRPr lang="en-US"/>
           </a:p>
@@ -2735,55 +2735,7 @@
                 <a:ea typeface="+mn-ea"/>
                 <a:cs typeface="+mn-cs"/>
               </a:rPr>
-              <a:t> existe una gran variedad de programas de contabilidad </a:t>
-            </a:r>
-            <a:r>
-              <a:rPr lang="es-ES" sz="1200" kern="1200" dirty="0" smtClean="0">
-                <a:solidFill>
-                  <a:schemeClr val="tx1"/>
-                </a:solidFill>
-                <a:effectLst/>
-                <a:latin typeface="+mn-lt"/>
-                <a:ea typeface="+mn-ea"/>
-                <a:cs typeface="+mn-cs"/>
-              </a:rPr>
-              <a:t>completos </a:t>
-            </a:r>
-            <a:r>
-              <a:rPr lang="es-ES" sz="1200" kern="1200" dirty="0" smtClean="0">
-                <a:solidFill>
-                  <a:schemeClr val="tx1"/>
-                </a:solidFill>
-                <a:effectLst/>
-                <a:latin typeface="+mn-lt"/>
-                <a:ea typeface="+mn-ea"/>
-                <a:cs typeface="+mn-cs"/>
-              </a:rPr>
-              <a:t>en sus funciones y muy </a:t>
-            </a:r>
-            <a:r>
-              <a:rPr lang="es-ES" sz="1200" kern="1200" dirty="0" smtClean="0">
-                <a:solidFill>
-                  <a:schemeClr val="tx1"/>
-                </a:solidFill>
-                <a:effectLst/>
-                <a:latin typeface="+mn-lt"/>
-                <a:ea typeface="+mn-ea"/>
-                <a:cs typeface="+mn-cs"/>
-              </a:rPr>
-              <a:t>complejos</a:t>
-            </a:r>
-            <a:r>
-              <a:rPr lang="es-ES" sz="1200" kern="1200" dirty="0" smtClean="0">
-                <a:solidFill>
-                  <a:schemeClr val="tx1"/>
-                </a:solidFill>
-                <a:effectLst/>
-                <a:latin typeface="+mn-lt"/>
-                <a:ea typeface="+mn-ea"/>
-                <a:cs typeface="+mn-cs"/>
-              </a:rPr>
-              <a:t>. </a:t>
+              <a:t> existe una gran variedad de programas de contabilidad completos en sus funciones y muy complejos. </a:t>
             </a:r>
           </a:p>
           <a:p>
@@ -3436,15 +3388,7 @@
             </a:r>
             <a:r>
               <a:rPr lang="es-ES" dirty="0" smtClean="0"/>
-              <a:t>" , </a:t>
-            </a:r>
-            <a:r>
-              <a:rPr lang="es-ES" dirty="0" smtClean="0"/>
-              <a:t> que </a:t>
-            </a:r>
-            <a:r>
-              <a:rPr lang="es-ES" dirty="0" smtClean="0"/>
-              <a:t>se encarga de hacer la </a:t>
+              <a:t>" ,  que se encarga de hacer la </a:t>
             </a:r>
             <a:r>
               <a:rPr lang="es-ES" dirty="0" err="1" smtClean="0"/>
@@ -3646,15 +3590,7 @@
             </a:r>
             <a:r>
               <a:rPr lang="es-ES" dirty="0" smtClean="0"/>
-              <a:t> que </a:t>
-            </a:r>
-            <a:r>
-              <a:rPr lang="es-ES" dirty="0" smtClean="0"/>
-              <a:t>es la </a:t>
-            </a:r>
-            <a:r>
-              <a:rPr lang="es-ES" dirty="0" smtClean="0"/>
-              <a:t>encargada de conectarse a la base de datos y la clase </a:t>
+              <a:t> que es la encargada de conectarse a la base de datos y la clase </a:t>
             </a:r>
             <a:r>
               <a:rPr lang="es-ES" dirty="0" err="1" smtClean="0"/>
@@ -3724,11 +3660,7 @@
             </a:r>
             <a:r>
               <a:rPr lang="es-ES" dirty="0" smtClean="0"/>
-              <a:t> </a:t>
-            </a:r>
-            <a:r>
-              <a:rPr lang="es-ES" dirty="0" smtClean="0"/>
-              <a:t>introducida por el usuario </a:t>
+              <a:t> introducida por el usuario </a:t>
             </a:r>
             <a:r>
               <a:rPr lang="es-ES" dirty="0" err="1" smtClean="0"/>
@@ -3744,15 +3676,7 @@
             </a:r>
             <a:r>
               <a:rPr lang="es-ES" dirty="0" smtClean="0"/>
-              <a:t>, </a:t>
-            </a:r>
-            <a:r>
-              <a:rPr lang="es-ES" dirty="0" smtClean="0"/>
-              <a:t>que </a:t>
-            </a:r>
-            <a:r>
-              <a:rPr lang="es-ES" dirty="0" smtClean="0"/>
-              <a:t>se encargan de hacer la </a:t>
+              <a:t>, que se encargan de hacer la </a:t>
             </a:r>
             <a:r>
               <a:rPr lang="es-ES" dirty="0" err="1" smtClean="0"/>
@@ -3792,15 +3716,7 @@
             </a:r>
             <a:r>
               <a:rPr lang="es-ES" dirty="0" smtClean="0"/>
-              <a:t> , las que </a:t>
-            </a:r>
-            <a:r>
-              <a:rPr lang="es-ES" dirty="0" smtClean="0"/>
-              <a:t>construyen </a:t>
-            </a:r>
-            <a:r>
-              <a:rPr lang="es-ES" dirty="0" smtClean="0"/>
-              <a:t>consultas para  el manejo de los registros en la base de datos con la </a:t>
+              <a:t> , las que construyen consultas para  el manejo de los registros en la base de datos con la </a:t>
             </a:r>
             <a:r>
               <a:rPr lang="es-ES" dirty="0" err="1" smtClean="0"/>
@@ -3903,15 +3819,7 @@
             </a:r>
             <a:r>
               <a:rPr lang="es-ES" dirty="0" smtClean="0"/>
-              <a:t> entre las tablas en la base de datos pretende ser </a:t>
-            </a:r>
-            <a:r>
-              <a:rPr lang="es-ES" dirty="0" smtClean="0"/>
-              <a:t>sencilla</a:t>
-            </a:r>
-            <a:r>
-              <a:rPr lang="es-ES" dirty="0" smtClean="0"/>
-              <a:t>. Existen 3 tablas que manejan la </a:t>
+              <a:t> entre las tablas en la base de datos pretende ser sencilla. Existen 3 tablas que manejan la </a:t>
             </a:r>
             <a:r>
               <a:rPr lang="es-ES" dirty="0" err="1" smtClean="0"/>
@@ -4043,15 +3951,7 @@
             </a:r>
             <a:r>
               <a:rPr lang="es-ES" b="0" baseline="0" dirty="0" smtClean="0"/>
-              <a:t>, </a:t>
-            </a:r>
-            <a:r>
-              <a:rPr lang="es-ES" b="0" baseline="0" dirty="0" smtClean="0"/>
-              <a:t>que </a:t>
-            </a:r>
-            <a:r>
-              <a:rPr lang="es-ES" b="0" baseline="0" dirty="0" smtClean="0"/>
-              <a:t>necesita ser explicada y </a:t>
+              <a:t>, que necesita ser explicada y </a:t>
             </a:r>
             <a:r>
               <a:rPr lang="es-ES" b="0" baseline="0" dirty="0" err="1" smtClean="0"/>
@@ -4059,11 +3959,7 @@
             </a:r>
             <a:r>
               <a:rPr lang="es-ES" b="0" baseline="0" dirty="0" smtClean="0"/>
-              <a:t> dispone de trazas de </a:t>
-            </a:r>
-            <a:r>
-              <a:rPr lang="es-ES" b="0" baseline="0" dirty="0" smtClean="0"/>
-              <a:t>cada </a:t>
+              <a:t> dispone de trazas de cada </a:t>
             </a:r>
             <a:r>
               <a:rPr lang="es-ES" b="0" baseline="0" dirty="0" err="1" smtClean="0"/>
@@ -4071,15 +3967,7 @@
             </a:r>
             <a:r>
               <a:rPr lang="es-ES" b="0" baseline="0" dirty="0" smtClean="0"/>
-              <a:t> </a:t>
-            </a:r>
-            <a:r>
-              <a:rPr lang="es-ES" b="0" baseline="0" dirty="0" smtClean="0"/>
-              <a:t>ejecutada y </a:t>
-            </a:r>
-            <a:r>
-              <a:rPr lang="es-ES" b="0" baseline="0" dirty="0" smtClean="0"/>
-              <a:t>se muestran en el log del programa para una mejor </a:t>
+              <a:t> ejecutada y se muestran en el log del programa para una mejor </a:t>
             </a:r>
             <a:r>
               <a:rPr lang="es-ES" b="0" baseline="0" dirty="0" err="1" smtClean="0"/>
@@ -4312,11 +4200,7 @@
             </a:pPr>
             <a:r>
               <a:rPr lang="es-ES" dirty="0" smtClean="0"/>
-              <a:t>En la </a:t>
-            </a:r>
-            <a:r>
-              <a:rPr lang="es-ES" dirty="0" smtClean="0"/>
-              <a:t>parte de arriba tenemos el </a:t>
+              <a:t>En la parte de arriba tenemos el </a:t>
             </a:r>
             <a:r>
               <a:rPr lang="es-ES" dirty="0" err="1" smtClean="0"/>
@@ -4408,15 +4292,7 @@
             </a:r>
             <a:r>
               <a:rPr lang="es-ES" dirty="0" smtClean="0"/>
-              <a:t> , lo que se denomina CRUD y ayudan al usuario con textos </a:t>
-            </a:r>
-            <a:r>
-              <a:rPr lang="es-ES" dirty="0" smtClean="0"/>
-              <a:t>auxiliares </a:t>
-            </a:r>
-            <a:r>
-              <a:rPr lang="es-ES" dirty="0" smtClean="0"/>
-              <a:t>para cada </a:t>
+              <a:t> , lo que se denomina CRUD y ayudan al usuario con textos auxiliares para cada </a:t>
             </a:r>
             <a:r>
               <a:rPr lang="es-ES" dirty="0" err="1" smtClean="0"/>
@@ -4450,15 +4326,7 @@
             </a:r>
             <a:r>
               <a:rPr lang="es-ES" dirty="0" smtClean="0"/>
-              <a:t> sobre </a:t>
-            </a:r>
-            <a:r>
-              <a:rPr lang="es-ES" dirty="0" smtClean="0"/>
-              <a:t>el </a:t>
-            </a:r>
-            <a:r>
-              <a:rPr lang="es-ES" dirty="0" smtClean="0"/>
-              <a:t>programa , la </a:t>
+              <a:t> sobre el programa , la </a:t>
             </a:r>
             <a:r>
               <a:rPr lang="es-ES" dirty="0" err="1" smtClean="0"/>
@@ -4710,15 +4578,7 @@
             </a:r>
             <a:r>
               <a:rPr lang="es-ES" dirty="0" smtClean="0"/>
-              <a:t> de los productos </a:t>
-            </a:r>
-            <a:r>
-              <a:rPr lang="es-ES" dirty="0" smtClean="0"/>
-              <a:t>de los que dispone </a:t>
-            </a:r>
-            <a:r>
-              <a:rPr lang="es-ES" dirty="0" smtClean="0"/>
-              <a:t>la empresa y el manejo de las funciones CRUD de los mismos.</a:t>
+              <a:t> de los productos de los que dispone la empresa y el manejo de las funciones CRUD de los mismos.</a:t>
             </a:r>
             <a:endParaRPr lang="en-US" dirty="0"/>
           </a:p>
@@ -4972,15 +4832,7 @@
             </a:pPr>
             <a:r>
               <a:rPr lang="es-ES" dirty="0" smtClean="0"/>
-              <a:t>La parte </a:t>
-            </a:r>
-            <a:r>
-              <a:rPr lang="es-ES" dirty="0" smtClean="0"/>
-              <a:t>de la </a:t>
-            </a:r>
-            <a:r>
-              <a:rPr lang="es-ES" dirty="0" smtClean="0"/>
-              <a:t>derecha muestra las facturas de la persona seleccionada y permite ver e imprimir  facturas.</a:t>
+              <a:t>La parte de la derecha muestra las facturas de la persona seleccionada y permite ver e imprimir  facturas.</a:t>
             </a:r>
             <a:endParaRPr lang="en-US" dirty="0"/>
           </a:p>
@@ -5072,11 +4924,7 @@
             </a:pPr>
             <a:r>
               <a:rPr lang="es-ES" baseline="0" dirty="0" smtClean="0"/>
-              <a:t>Este panel ofrece crear, ver e imprimir facturas. El panel esta dividido en 3 partes. La parte de </a:t>
-            </a:r>
-            <a:r>
-              <a:rPr lang="es-ES" baseline="0" dirty="0" smtClean="0"/>
-              <a:t>la izquierda </a:t>
+              <a:t>Este panel ofrece crear, ver e imprimir facturas. El panel esta dividido en 3 partes. La parte de la izquierda </a:t>
             </a:r>
             <a:r>
               <a:rPr lang="es-ES" baseline="0" dirty="0" err="1" smtClean="0"/>
@@ -5094,15 +4942,7 @@
             </a:pPr>
             <a:r>
               <a:rPr lang="es-ES" baseline="0" dirty="0" smtClean="0"/>
-              <a:t>La parte </a:t>
-            </a:r>
-            <a:r>
-              <a:rPr lang="es-ES" baseline="0" dirty="0" smtClean="0"/>
-              <a:t>de la </a:t>
-            </a:r>
-            <a:r>
-              <a:rPr lang="es-ES" baseline="0" dirty="0" smtClean="0"/>
-              <a:t>derecha , la primera tabla muestra la persona a la que pertenece esta factura y la segunda tabla muestra la lista de los productos.</a:t>
+              <a:t>La parte de la derecha , la primera tabla muestra la persona a la que pertenece esta factura y la segunda tabla muestra la lista de los productos.</a:t>
             </a:r>
           </a:p>
           <a:p>
@@ -5533,7 +5373,7 @@
             <a:fld id="{B61BEF0D-F0BB-DE4B-95CE-6DB70DBA9567}" type="datetimeFigureOut">
               <a:rPr lang="en-US" smtClean="0"/>
               <a:pPr/>
-              <a:t>15-Dec-19</a:t>
+              <a:t>17-Dec-19</a:t>
             </a:fld>
             <a:endParaRPr lang="en-US" dirty="0"/>
           </a:p>
@@ -5807,7 +5647,7 @@
             <a:fld id="{B61BEF0D-F0BB-DE4B-95CE-6DB70DBA9567}" type="datetimeFigureOut">
               <a:rPr lang="en-US" smtClean="0"/>
               <a:pPr/>
-              <a:t>15-Dec-19</a:t>
+              <a:t>17-Dec-19</a:t>
             </a:fld>
             <a:endParaRPr lang="en-US" dirty="0"/>
           </a:p>
@@ -6040,7 +5880,7 @@
             <a:fld id="{B61BEF0D-F0BB-DE4B-95CE-6DB70DBA9567}" type="datetimeFigureOut">
               <a:rPr lang="en-US" smtClean="0"/>
               <a:pPr/>
-              <a:t>15-Dec-19</a:t>
+              <a:t>17-Dec-19</a:t>
             </a:fld>
             <a:endParaRPr lang="en-US" dirty="0"/>
           </a:p>
@@ -6352,7 +6192,7 @@
             <a:fld id="{B61BEF0D-F0BB-DE4B-95CE-6DB70DBA9567}" type="datetimeFigureOut">
               <a:rPr lang="en-US" smtClean="0"/>
               <a:pPr/>
-              <a:t>15-Dec-19</a:t>
+              <a:t>17-Dec-19</a:t>
             </a:fld>
             <a:endParaRPr lang="en-US" dirty="0"/>
           </a:p>
@@ -6827,7 +6667,7 @@
             <a:fld id="{B61BEF0D-F0BB-DE4B-95CE-6DB70DBA9567}" type="datetimeFigureOut">
               <a:rPr lang="en-US" smtClean="0"/>
               <a:pPr/>
-              <a:t>15-Dec-19</a:t>
+              <a:t>17-Dec-19</a:t>
             </a:fld>
             <a:endParaRPr lang="en-US" dirty="0"/>
           </a:p>
@@ -7376,7 +7216,7 @@
             <a:fld id="{B61BEF0D-F0BB-DE4B-95CE-6DB70DBA9567}" type="datetimeFigureOut">
               <a:rPr lang="en-US" smtClean="0"/>
               <a:pPr/>
-              <a:t>15-Dec-19</a:t>
+              <a:t>17-Dec-19</a:t>
             </a:fld>
             <a:endParaRPr lang="en-US" dirty="0"/>
           </a:p>
@@ -8152,7 +7992,7 @@
             <a:fld id="{B61BEF0D-F0BB-DE4B-95CE-6DB70DBA9567}" type="datetimeFigureOut">
               <a:rPr lang="en-US" smtClean="0"/>
               <a:pPr/>
-              <a:t>15-Dec-19</a:t>
+              <a:t>17-Dec-19</a:t>
             </a:fld>
             <a:endParaRPr lang="en-US" dirty="0"/>
           </a:p>
@@ -8328,7 +8168,7 @@
           <a:p>
             <a:fld id="{55C6B4A9-1611-4792-9094-5F34BCA07E0B}" type="datetimeFigureOut">
               <a:rPr lang="en-US" smtClean="0"/>
-              <a:t>15-Dec-19</a:t>
+              <a:t>17-Dec-19</a:t>
             </a:fld>
             <a:endParaRPr lang="en-US" dirty="0"/>
           </a:p>
@@ -8552,7 +8392,7 @@
             <a:fld id="{B61BEF0D-F0BB-DE4B-95CE-6DB70DBA9567}" type="datetimeFigureOut">
               <a:rPr lang="en-US" smtClean="0"/>
               <a:pPr/>
-              <a:t>15-Dec-19</a:t>
+              <a:t>17-Dec-19</a:t>
             </a:fld>
             <a:endParaRPr lang="en-US" dirty="0"/>
           </a:p>
@@ -8700,7 +8540,7 @@
           <p:cNvPr id="9" name="Chart 8">
             <a:extLst>
               <a:ext uri="{FF2B5EF4-FFF2-40B4-BE49-F238E27FC236}">
-                <a16:creationId xmlns:a16="http://schemas.microsoft.com/office/drawing/2014/main" xmlns="" id="{4D20A72C-E8E4-4D81-9589-00AC44CC89D5}"/>
+                <a16:creationId xmlns="" xmlns:a16="http://schemas.microsoft.com/office/drawing/2014/main" id="{4D20A72C-E8E4-4D81-9589-00AC44CC89D5}"/>
               </a:ext>
             </a:extLst>
           </p:cNvPr>
@@ -8724,7 +8564,7 @@
         </a:graphic>
       </p:graphicFrame>
       <mc:AlternateContent xmlns:mc="http://schemas.openxmlformats.org/markup-compatibility/2006">
-        <mc:Choice xmlns:cx1="http://schemas.microsoft.com/office/drawing/2015/9/8/chartex" xmlns="" Requires="cx1">
+        <mc:Choice xmlns="" xmlns:cx1="http://schemas.microsoft.com/office/drawing/2015/9/8/chartex" Requires="cx1">
           <p:graphicFrame>
             <p:nvGraphicFramePr>
               <p:cNvPr id="12" name="Chart 11">
@@ -8760,7 +8600,7 @@
               <p:cNvPr id="12" name="Chart 11">
                 <a:extLst>
                   <a:ext uri="{FF2B5EF4-FFF2-40B4-BE49-F238E27FC236}">
-                    <a16:creationId xmlns:a16="http://schemas.microsoft.com/office/drawing/2014/main" xmlns="" xmlns:cx1="http://schemas.microsoft.com/office/drawing/2015/9/8/chartex" id="{DF1DA705-C4C0-4F5E-9C2B-E92E8118798B}"/>
+                    <a16:creationId xmlns:cx1="http://schemas.microsoft.com/office/drawing/2015/9/8/chartex" xmlns="" xmlns:a16="http://schemas.microsoft.com/office/drawing/2014/main" id="{DF1DA705-C4C0-4F5E-9C2B-E92E8118798B}"/>
                   </a:ext>
                 </a:extLst>
               </p:cNvPr>
@@ -8792,7 +8632,7 @@
           <p:cNvPr id="13" name="Title 12">
             <a:extLst>
               <a:ext uri="{FF2B5EF4-FFF2-40B4-BE49-F238E27FC236}">
-                <a16:creationId xmlns:a16="http://schemas.microsoft.com/office/drawing/2014/main" xmlns="" id="{C4C192FD-AB17-45C2-8E4D-5DA9CA177EBD}"/>
+                <a16:creationId xmlns="" xmlns:a16="http://schemas.microsoft.com/office/drawing/2014/main" id="{C4C192FD-AB17-45C2-8E4D-5DA9CA177EBD}"/>
               </a:ext>
             </a:extLst>
           </p:cNvPr>
@@ -8829,7 +8669,7 @@
         </p:txBody>
       </p:sp>
       <mc:AlternateContent xmlns:mc="http://schemas.openxmlformats.org/markup-compatibility/2006">
-        <mc:Choice xmlns:cx2="http://schemas.microsoft.com/office/drawing/2015/10/21/chartex" xmlns="" Requires="cx2">
+        <mc:Choice xmlns="" xmlns:cx2="http://schemas.microsoft.com/office/drawing/2015/10/21/chartex" Requires="cx2">
           <p:graphicFrame>
             <p:nvGraphicFramePr>
               <p:cNvPr id="16" name="Chart 15">
@@ -8865,7 +8705,7 @@
               <p:cNvPr id="16" name="Chart 15">
                 <a:extLst>
                   <a:ext uri="{FF2B5EF4-FFF2-40B4-BE49-F238E27FC236}">
-                    <a16:creationId xmlns:a16="http://schemas.microsoft.com/office/drawing/2014/main" xmlns="" xmlns:cx2="http://schemas.microsoft.com/office/drawing/2015/10/21/chartex" id="{0A7361D1-C986-4DF1-9480-BB68EC582975}"/>
+                    <a16:creationId xmlns:cx2="http://schemas.microsoft.com/office/drawing/2015/10/21/chartex" xmlns="" xmlns:a16="http://schemas.microsoft.com/office/drawing/2014/main" id="{0A7361D1-C986-4DF1-9480-BB68EC582975}"/>
                   </a:ext>
                 </a:extLst>
               </p:cNvPr>
@@ -9015,7 +8855,7 @@
             <a:fld id="{B61BEF0D-F0BB-DE4B-95CE-6DB70DBA9567}" type="datetimeFigureOut">
               <a:rPr lang="en-US" smtClean="0"/>
               <a:pPr/>
-              <a:t>15-Dec-19</a:t>
+              <a:t>17-Dec-19</a:t>
             </a:fld>
             <a:endParaRPr lang="en-US" dirty="0"/>
           </a:p>
@@ -9306,7 +9146,7 @@
             <a:fld id="{B61BEF0D-F0BB-DE4B-95CE-6DB70DBA9567}" type="datetimeFigureOut">
               <a:rPr lang="en-US" smtClean="0"/>
               <a:pPr/>
-              <a:t>15-Dec-19</a:t>
+              <a:t>17-Dec-19</a:t>
             </a:fld>
             <a:endParaRPr lang="en-US" dirty="0"/>
           </a:p>
@@ -9554,7 +9394,7 @@
           <a:p>
             <a:fld id="{EB712588-04B1-427B-82EE-E8DB90309F08}" type="datetimeFigureOut">
               <a:rPr lang="en-US" smtClean="0"/>
-              <a:t>15-Dec-19</a:t>
+              <a:t>17-Dec-19</a:t>
             </a:fld>
             <a:endParaRPr lang="en-US" dirty="0"/>
           </a:p>
@@ -9934,7 +9774,7 @@
             <a:fld id="{B61BEF0D-F0BB-DE4B-95CE-6DB70DBA9567}" type="datetimeFigureOut">
               <a:rPr lang="en-US" smtClean="0"/>
               <a:pPr/>
-              <a:t>15-Dec-19</a:t>
+              <a:t>17-Dec-19</a:t>
             </a:fld>
             <a:endParaRPr lang="en-US" dirty="0"/>
           </a:p>
@@ -10054,7 +9894,7 @@
             <a:fld id="{B61BEF0D-F0BB-DE4B-95CE-6DB70DBA9567}" type="datetimeFigureOut">
               <a:rPr lang="en-US" smtClean="0"/>
               <a:pPr/>
-              <a:t>15-Dec-19</a:t>
+              <a:t>17-Dec-19</a:t>
             </a:fld>
             <a:endParaRPr lang="en-US" dirty="0"/>
           </a:p>
@@ -10151,7 +9991,7 @@
             <a:fld id="{B61BEF0D-F0BB-DE4B-95CE-6DB70DBA9567}" type="datetimeFigureOut">
               <a:rPr lang="en-US" smtClean="0"/>
               <a:pPr/>
-              <a:t>15-Dec-19</a:t>
+              <a:t>17-Dec-19</a:t>
             </a:fld>
             <a:endParaRPr lang="en-US" dirty="0"/>
           </a:p>
@@ -10401,7 +10241,7 @@
           <a:p>
             <a:fld id="{42A54C80-263E-416B-A8E0-580EDEADCBDC}" type="datetimeFigureOut">
               <a:rPr lang="en-US" smtClean="0"/>
-              <a:t>15-Dec-19</a:t>
+              <a:t>17-Dec-19</a:t>
             </a:fld>
             <a:endParaRPr lang="en-US" dirty="0"/>
           </a:p>
@@ -10659,7 +10499,7 @@
             <a:fld id="{B61BEF0D-F0BB-DE4B-95CE-6DB70DBA9567}" type="datetimeFigureOut">
               <a:rPr lang="en-US" smtClean="0"/>
               <a:pPr/>
-              <a:t>15-Dec-19</a:t>
+              <a:t>17-Dec-19</a:t>
             </a:fld>
             <a:endParaRPr lang="en-US" dirty="0"/>
           </a:p>
@@ -10904,7 +10744,7 @@
             <a:fld id="{B61BEF0D-F0BB-DE4B-95CE-6DB70DBA9567}" type="datetimeFigureOut">
               <a:rPr lang="en-US" smtClean="0"/>
               <a:pPr/>
-              <a:t>15-Dec-19</a:t>
+              <a:t>17-Dec-19</a:t>
             </a:fld>
             <a:endParaRPr lang="en-US" dirty="0"/>
           </a:p>
@@ -11519,33 +11359,15 @@
                                   </p:childTnLst>
                                 </p:cTn>
                               </p:par>
-                            </p:childTnLst>
-                          </p:cTn>
-                        </p:par>
-                      </p:childTnLst>
-                    </p:cTn>
-                  </p:par>
-                  <p:par>
-                    <p:cTn id="8" fill="hold">
-                      <p:stCondLst>
-                        <p:cond delay="indefinite"/>
-                      </p:stCondLst>
-                      <p:childTnLst>
-                        <p:par>
-                          <p:cTn id="9" fill="hold">
-                            <p:stCondLst>
-                              <p:cond delay="0"/>
-                            </p:stCondLst>
-                            <p:childTnLst>
                               <p:par>
-                                <p:cTn id="10" presetID="22" presetClass="entr" presetSubtype="4" fill="hold" nodeType="clickEffect">
+                                <p:cTn id="8" presetID="22" presetClass="entr" presetSubtype="4" fill="hold" nodeType="withEffect">
                                   <p:stCondLst>
-                                    <p:cond delay="500"/>
+                                    <p:cond delay="700"/>
                                   </p:stCondLst>
                                   <p:childTnLst>
                                     <p:set>
                                       <p:cBhvr>
-                                        <p:cTn id="11" dur="1" fill="hold">
+                                        <p:cTn id="9" dur="1" fill="hold">
                                           <p:stCondLst>
                                             <p:cond delay="0"/>
                                           </p:stCondLst>
@@ -11563,7 +11385,7 @@
                                     </p:set>
                                     <p:animEffect transition="in" filter="wipe(down)">
                                       <p:cBhvr>
-                                        <p:cTn id="12" dur="1000"/>
+                                        <p:cTn id="10" dur="1000"/>
                                         <p:tgtEl>
                                           <p:spTgt spid="3"/>
                                         </p:tgtEl>
@@ -11573,14 +11395,14 @@
                                 </p:cTn>
                               </p:par>
                               <p:par>
-                                <p:cTn id="13" presetID="22" presetClass="entr" presetSubtype="4" fill="hold" nodeType="withEffect">
+                                <p:cTn id="11" presetID="22" presetClass="entr" presetSubtype="4" fill="hold" nodeType="withEffect">
                                   <p:stCondLst>
-                                    <p:cond delay="1000"/>
+                                    <p:cond delay="1400"/>
                                   </p:stCondLst>
                                   <p:childTnLst>
                                     <p:set>
                                       <p:cBhvr>
-                                        <p:cTn id="14" dur="1" fill="hold">
+                                        <p:cTn id="12" dur="1" fill="hold">
                                           <p:stCondLst>
                                             <p:cond delay="0"/>
                                           </p:stCondLst>
@@ -11598,7 +11420,7 @@
                                     </p:set>
                                     <p:animEffect transition="in" filter="wipe(down)">
                                       <p:cBhvr>
-                                        <p:cTn id="15" dur="1000"/>
+                                        <p:cTn id="13" dur="1000"/>
                                         <p:tgtEl>
                                           <p:spTgt spid="5"/>
                                         </p:tgtEl>
@@ -11614,26 +11436,26 @@
                     </p:cTn>
                   </p:par>
                   <p:par>
-                    <p:cTn id="16" fill="hold">
+                    <p:cTn id="14" fill="hold">
                       <p:stCondLst>
                         <p:cond delay="indefinite"/>
                       </p:stCondLst>
                       <p:childTnLst>
                         <p:par>
-                          <p:cTn id="17" fill="hold">
+                          <p:cTn id="15" fill="hold">
                             <p:stCondLst>
                               <p:cond delay="0"/>
                             </p:stCondLst>
                             <p:childTnLst>
                               <p:par>
-                                <p:cTn id="18" presetID="14" presetClass="exit" presetSubtype="10" fill="hold" grpId="1" nodeType="clickEffect">
+                                <p:cTn id="16" presetID="14" presetClass="exit" presetSubtype="10" fill="hold" grpId="1" nodeType="clickEffect">
                                   <p:stCondLst>
                                     <p:cond delay="0"/>
                                   </p:stCondLst>
                                   <p:childTnLst>
                                     <p:animEffect transition="out" filter="randombar(horizontal)">
                                       <p:cBhvr>
-                                        <p:cTn id="19" dur="1000"/>
+                                        <p:cTn id="17" dur="1000"/>
                                         <p:tgtEl>
                                           <p:spTgt spid="6"/>
                                         </p:tgtEl>
@@ -11641,7 +11463,7 @@
                                     </p:animEffect>
                                     <p:set>
                                       <p:cBhvr>
-                                        <p:cTn id="20" dur="1" fill="hold">
+                                        <p:cTn id="18" dur="1" fill="hold">
                                           <p:stCondLst>
                                             <p:cond delay="999"/>
                                           </p:stCondLst>
@@ -11661,14 +11483,14 @@
                                 </p:cTn>
                               </p:par>
                               <p:par>
-                                <p:cTn id="21" presetID="14" presetClass="exit" presetSubtype="10" fill="hold" nodeType="withEffect">
+                                <p:cTn id="19" presetID="14" presetClass="exit" presetSubtype="10" fill="hold" nodeType="withEffect">
                                   <p:stCondLst>
                                     <p:cond delay="0"/>
                                   </p:stCondLst>
                                   <p:childTnLst>
                                     <p:animEffect transition="out" filter="randombar(horizontal)">
                                       <p:cBhvr>
-                                        <p:cTn id="22" dur="1000"/>
+                                        <p:cTn id="20" dur="1000"/>
                                         <p:tgtEl>
                                           <p:spTgt spid="3"/>
                                         </p:tgtEl>
@@ -11676,7 +11498,7 @@
                                     </p:animEffect>
                                     <p:set>
                                       <p:cBhvr>
-                                        <p:cTn id="23" dur="1" fill="hold">
+                                        <p:cTn id="21" dur="1" fill="hold">
                                           <p:stCondLst>
                                             <p:cond delay="999"/>
                                           </p:stCondLst>
@@ -11696,14 +11518,14 @@
                                 </p:cTn>
                               </p:par>
                               <p:par>
-                                <p:cTn id="24" presetID="14" presetClass="exit" presetSubtype="10" fill="hold" nodeType="withEffect">
+                                <p:cTn id="22" presetID="14" presetClass="exit" presetSubtype="10" fill="hold" nodeType="withEffect">
                                   <p:stCondLst>
                                     <p:cond delay="0"/>
                                   </p:stCondLst>
                                   <p:childTnLst>
                                     <p:animEffect transition="out" filter="randombar(horizontal)">
                                       <p:cBhvr>
-                                        <p:cTn id="25" dur="1000"/>
+                                        <p:cTn id="23" dur="1000"/>
                                         <p:tgtEl>
                                           <p:spTgt spid="5"/>
                                         </p:tgtEl>
@@ -11711,7 +11533,7 @@
                                     </p:animEffect>
                                     <p:set>
                                       <p:cBhvr>
-                                        <p:cTn id="26" dur="1" fill="hold">
+                                        <p:cTn id="24" dur="1" fill="hold">
                                           <p:stCondLst>
                                             <p:cond delay="999"/>
                                           </p:stCondLst>
@@ -11902,7 +11724,7 @@
           <p:cNvPr id="4" name="Title 1">
             <a:extLst>
               <a:ext uri="{FF2B5EF4-FFF2-40B4-BE49-F238E27FC236}">
-                <a16:creationId xmlns:a16="http://schemas.microsoft.com/office/drawing/2014/main" xmlns="" id="{9DE94162-323C-48DA-8B52-07C80BAC06EE}"/>
+                <a16:creationId xmlns="" xmlns:a16="http://schemas.microsoft.com/office/drawing/2014/main" id="{9DE94162-323C-48DA-8B52-07C80BAC06EE}"/>
               </a:ext>
             </a:extLst>
           </p:cNvPr>
@@ -12126,6 +11948,9 @@
                     <p:cTn id="3" fill="hold">
                       <p:stCondLst>
                         <p:cond delay="indefinite"/>
+                        <p:cond evt="onBegin" delay="0">
+                          <p:tn val="2"/>
+                        </p:cond>
                       </p:stCondLst>
                       <p:childTnLst>
                         <p:par>
@@ -12135,7 +11960,7 @@
                             </p:stCondLst>
                             <p:childTnLst>
                               <p:par>
-                                <p:cTn id="5" presetID="2" presetClass="entr" presetSubtype="4" fill="hold" grpId="0" nodeType="clickEffect">
+                                <p:cTn id="5" presetID="2" presetClass="entr" presetSubtype="4" fill="hold" grpId="0" nodeType="withEffect">
                                   <p:stCondLst>
                                     <p:cond delay="0"/>
                                   </p:stCondLst>
@@ -12186,6 +12011,298 @@
                                         <p:cTn id="8" dur="500" fill="hold"/>
                                         <p:tgtEl>
                                           <p:spTgt spid="4"/>
+                                        </p:tgtEl>
+                                        <p:attrNameLst>
+                                          <p:attrName>ppt_y</p:attrName>
+                                        </p:attrNameLst>
+                                      </p:cBhvr>
+                                      <p:tavLst>
+                                        <p:tav tm="0">
+                                          <p:val>
+                                            <p:strVal val="1+#ppt_h/2"/>
+                                          </p:val>
+                                        </p:tav>
+                                        <p:tav tm="100000">
+                                          <p:val>
+                                            <p:strVal val="#ppt_y"/>
+                                          </p:val>
+                                        </p:tav>
+                                      </p:tavLst>
+                                    </p:anim>
+                                  </p:childTnLst>
+                                </p:cTn>
+                              </p:par>
+                              <p:par>
+                                <p:cTn id="9" presetID="2" presetClass="entr" presetSubtype="4" fill="hold" nodeType="withEffect">
+                                  <p:stCondLst>
+                                    <p:cond delay="500"/>
+                                  </p:stCondLst>
+                                  <p:childTnLst>
+                                    <p:set>
+                                      <p:cBhvr>
+                                        <p:cTn id="10" dur="1" fill="hold">
+                                          <p:stCondLst>
+                                            <p:cond delay="0"/>
+                                          </p:stCondLst>
+                                        </p:cTn>
+                                        <p:tgtEl>
+                                          <p:spTgt spid="6"/>
+                                        </p:tgtEl>
+                                        <p:attrNameLst>
+                                          <p:attrName>style.visibility</p:attrName>
+                                        </p:attrNameLst>
+                                      </p:cBhvr>
+                                      <p:to>
+                                        <p:strVal val="visible"/>
+                                      </p:to>
+                                    </p:set>
+                                    <p:anim calcmode="lin" valueType="num">
+                                      <p:cBhvr additive="base">
+                                        <p:cTn id="11" dur="1000" fill="hold"/>
+                                        <p:tgtEl>
+                                          <p:spTgt spid="6"/>
+                                        </p:tgtEl>
+                                        <p:attrNameLst>
+                                          <p:attrName>ppt_x</p:attrName>
+                                        </p:attrNameLst>
+                                      </p:cBhvr>
+                                      <p:tavLst>
+                                        <p:tav tm="0">
+                                          <p:val>
+                                            <p:strVal val="#ppt_x"/>
+                                          </p:val>
+                                        </p:tav>
+                                        <p:tav tm="100000">
+                                          <p:val>
+                                            <p:strVal val="#ppt_x"/>
+                                          </p:val>
+                                        </p:tav>
+                                      </p:tavLst>
+                                    </p:anim>
+                                    <p:anim calcmode="lin" valueType="num">
+                                      <p:cBhvr additive="base">
+                                        <p:cTn id="12" dur="1000" fill="hold"/>
+                                        <p:tgtEl>
+                                          <p:spTgt spid="6"/>
+                                        </p:tgtEl>
+                                        <p:attrNameLst>
+                                          <p:attrName>ppt_y</p:attrName>
+                                        </p:attrNameLst>
+                                      </p:cBhvr>
+                                      <p:tavLst>
+                                        <p:tav tm="0">
+                                          <p:val>
+                                            <p:strVal val="1+#ppt_h/2"/>
+                                          </p:val>
+                                        </p:tav>
+                                        <p:tav tm="100000">
+                                          <p:val>
+                                            <p:strVal val="#ppt_y"/>
+                                          </p:val>
+                                        </p:tav>
+                                      </p:tavLst>
+                                    </p:anim>
+                                  </p:childTnLst>
+                                </p:cTn>
+                              </p:par>
+                              <p:par>
+                                <p:cTn id="13" presetID="2" presetClass="entr" presetSubtype="4" fill="hold" nodeType="withEffect">
+                                  <p:stCondLst>
+                                    <p:cond delay="1000"/>
+                                  </p:stCondLst>
+                                  <p:childTnLst>
+                                    <p:set>
+                                      <p:cBhvr>
+                                        <p:cTn id="14" dur="1" fill="hold">
+                                          <p:stCondLst>
+                                            <p:cond delay="0"/>
+                                          </p:stCondLst>
+                                        </p:cTn>
+                                        <p:tgtEl>
+                                          <p:spTgt spid="5"/>
+                                        </p:tgtEl>
+                                        <p:attrNameLst>
+                                          <p:attrName>style.visibility</p:attrName>
+                                        </p:attrNameLst>
+                                      </p:cBhvr>
+                                      <p:to>
+                                        <p:strVal val="visible"/>
+                                      </p:to>
+                                    </p:set>
+                                    <p:anim calcmode="lin" valueType="num">
+                                      <p:cBhvr additive="base">
+                                        <p:cTn id="15" dur="1000" fill="hold"/>
+                                        <p:tgtEl>
+                                          <p:spTgt spid="5"/>
+                                        </p:tgtEl>
+                                        <p:attrNameLst>
+                                          <p:attrName>ppt_x</p:attrName>
+                                        </p:attrNameLst>
+                                      </p:cBhvr>
+                                      <p:tavLst>
+                                        <p:tav tm="0">
+                                          <p:val>
+                                            <p:strVal val="#ppt_x"/>
+                                          </p:val>
+                                        </p:tav>
+                                        <p:tav tm="100000">
+                                          <p:val>
+                                            <p:strVal val="#ppt_x"/>
+                                          </p:val>
+                                        </p:tav>
+                                      </p:tavLst>
+                                    </p:anim>
+                                    <p:anim calcmode="lin" valueType="num">
+                                      <p:cBhvr additive="base">
+                                        <p:cTn id="16" dur="1000" fill="hold"/>
+                                        <p:tgtEl>
+                                          <p:spTgt spid="5"/>
+                                        </p:tgtEl>
+                                        <p:attrNameLst>
+                                          <p:attrName>ppt_y</p:attrName>
+                                        </p:attrNameLst>
+                                      </p:cBhvr>
+                                      <p:tavLst>
+                                        <p:tav tm="0">
+                                          <p:val>
+                                            <p:strVal val="1+#ppt_h/2"/>
+                                          </p:val>
+                                        </p:tav>
+                                        <p:tav tm="100000">
+                                          <p:val>
+                                            <p:strVal val="#ppt_y"/>
+                                          </p:val>
+                                        </p:tav>
+                                      </p:tavLst>
+                                    </p:anim>
+                                  </p:childTnLst>
+                                </p:cTn>
+                              </p:par>
+                              <p:par>
+                                <p:cTn id="17" presetID="2" presetClass="entr" presetSubtype="4" fill="hold" nodeType="withEffect">
+                                  <p:stCondLst>
+                                    <p:cond delay="1500"/>
+                                  </p:stCondLst>
+                                  <p:childTnLst>
+                                    <p:set>
+                                      <p:cBhvr>
+                                        <p:cTn id="18" dur="1" fill="hold">
+                                          <p:stCondLst>
+                                            <p:cond delay="0"/>
+                                          </p:stCondLst>
+                                        </p:cTn>
+                                        <p:tgtEl>
+                                          <p:spTgt spid="8"/>
+                                        </p:tgtEl>
+                                        <p:attrNameLst>
+                                          <p:attrName>style.visibility</p:attrName>
+                                        </p:attrNameLst>
+                                      </p:cBhvr>
+                                      <p:to>
+                                        <p:strVal val="visible"/>
+                                      </p:to>
+                                    </p:set>
+                                    <p:anim calcmode="lin" valueType="num">
+                                      <p:cBhvr additive="base">
+                                        <p:cTn id="19" dur="1000" fill="hold"/>
+                                        <p:tgtEl>
+                                          <p:spTgt spid="8"/>
+                                        </p:tgtEl>
+                                        <p:attrNameLst>
+                                          <p:attrName>ppt_x</p:attrName>
+                                        </p:attrNameLst>
+                                      </p:cBhvr>
+                                      <p:tavLst>
+                                        <p:tav tm="0">
+                                          <p:val>
+                                            <p:strVal val="#ppt_x"/>
+                                          </p:val>
+                                        </p:tav>
+                                        <p:tav tm="100000">
+                                          <p:val>
+                                            <p:strVal val="#ppt_x"/>
+                                          </p:val>
+                                        </p:tav>
+                                      </p:tavLst>
+                                    </p:anim>
+                                    <p:anim calcmode="lin" valueType="num">
+                                      <p:cBhvr additive="base">
+                                        <p:cTn id="20" dur="1000" fill="hold"/>
+                                        <p:tgtEl>
+                                          <p:spTgt spid="8"/>
+                                        </p:tgtEl>
+                                        <p:attrNameLst>
+                                          <p:attrName>ppt_y</p:attrName>
+                                        </p:attrNameLst>
+                                      </p:cBhvr>
+                                      <p:tavLst>
+                                        <p:tav tm="0">
+                                          <p:val>
+                                            <p:strVal val="1+#ppt_h/2"/>
+                                          </p:val>
+                                        </p:tav>
+                                        <p:tav tm="100000">
+                                          <p:val>
+                                            <p:strVal val="#ppt_y"/>
+                                          </p:val>
+                                        </p:tav>
+                                      </p:tavLst>
+                                    </p:anim>
+                                  </p:childTnLst>
+                                </p:cTn>
+                              </p:par>
+                              <p:par>
+                                <p:cTn id="21" presetID="2" presetClass="entr" presetSubtype="4" fill="hold" nodeType="withEffect">
+                                  <p:stCondLst>
+                                    <p:cond delay="2000"/>
+                                  </p:stCondLst>
+                                  <p:childTnLst>
+                                    <p:set>
+                                      <p:cBhvr>
+                                        <p:cTn id="22" dur="1" fill="hold">
+                                          <p:stCondLst>
+                                            <p:cond delay="0"/>
+                                          </p:stCondLst>
+                                        </p:cTn>
+                                        <p:tgtEl>
+                                          <p:spTgt spid="7"/>
+                                        </p:tgtEl>
+                                        <p:attrNameLst>
+                                          <p:attrName>style.visibility</p:attrName>
+                                        </p:attrNameLst>
+                                      </p:cBhvr>
+                                      <p:to>
+                                        <p:strVal val="visible"/>
+                                      </p:to>
+                                    </p:set>
+                                    <p:anim calcmode="lin" valueType="num">
+                                      <p:cBhvr additive="base">
+                                        <p:cTn id="23" dur="1000" fill="hold"/>
+                                        <p:tgtEl>
+                                          <p:spTgt spid="7"/>
+                                        </p:tgtEl>
+                                        <p:attrNameLst>
+                                          <p:attrName>ppt_x</p:attrName>
+                                        </p:attrNameLst>
+                                      </p:cBhvr>
+                                      <p:tavLst>
+                                        <p:tav tm="0">
+                                          <p:val>
+                                            <p:strVal val="#ppt_x"/>
+                                          </p:val>
+                                        </p:tav>
+                                        <p:tav tm="100000">
+                                          <p:val>
+                                            <p:strVal val="#ppt_x"/>
+                                          </p:val>
+                                        </p:tav>
+                                      </p:tavLst>
+                                    </p:anim>
+                                    <p:anim calcmode="lin" valueType="num">
+                                      <p:cBhvr additive="base">
+                                        <p:cTn id="24" dur="1000" fill="hold"/>
+                                        <p:tgtEl>
+                                          <p:spTgt spid="7"/>
                                         </p:tgtEl>
                                         <p:attrNameLst>
                                           <p:attrName>ppt_y</p:attrName>
@@ -12214,336 +12331,26 @@
                     </p:cTn>
                   </p:par>
                   <p:par>
-                    <p:cTn id="9" fill="hold">
+                    <p:cTn id="25" fill="hold">
                       <p:stCondLst>
                         <p:cond delay="indefinite"/>
                       </p:stCondLst>
                       <p:childTnLst>
                         <p:par>
-                          <p:cTn id="10" fill="hold">
+                          <p:cTn id="26" fill="hold">
                             <p:stCondLst>
                               <p:cond delay="0"/>
                             </p:stCondLst>
                             <p:childTnLst>
                               <p:par>
-                                <p:cTn id="11" presetID="2" presetClass="entr" presetSubtype="4" fill="hold" nodeType="clickEffect">
-                                  <p:stCondLst>
-                                    <p:cond delay="500"/>
-                                  </p:stCondLst>
-                                  <p:childTnLst>
-                                    <p:set>
-                                      <p:cBhvr>
-                                        <p:cTn id="12" dur="1" fill="hold">
-                                          <p:stCondLst>
-                                            <p:cond delay="0"/>
-                                          </p:stCondLst>
-                                        </p:cTn>
-                                        <p:tgtEl>
-                                          <p:spTgt spid="6"/>
-                                        </p:tgtEl>
-                                        <p:attrNameLst>
-                                          <p:attrName>style.visibility</p:attrName>
-                                        </p:attrNameLst>
-                                      </p:cBhvr>
-                                      <p:to>
-                                        <p:strVal val="visible"/>
-                                      </p:to>
-                                    </p:set>
-                                    <p:anim calcmode="lin" valueType="num">
-                                      <p:cBhvr additive="base">
-                                        <p:cTn id="13" dur="1000" fill="hold"/>
-                                        <p:tgtEl>
-                                          <p:spTgt spid="6"/>
-                                        </p:tgtEl>
-                                        <p:attrNameLst>
-                                          <p:attrName>ppt_x</p:attrName>
-                                        </p:attrNameLst>
-                                      </p:cBhvr>
-                                      <p:tavLst>
-                                        <p:tav tm="0">
-                                          <p:val>
-                                            <p:strVal val="#ppt_x"/>
-                                          </p:val>
-                                        </p:tav>
-                                        <p:tav tm="100000">
-                                          <p:val>
-                                            <p:strVal val="#ppt_x"/>
-                                          </p:val>
-                                        </p:tav>
-                                      </p:tavLst>
-                                    </p:anim>
-                                    <p:anim calcmode="lin" valueType="num">
-                                      <p:cBhvr additive="base">
-                                        <p:cTn id="14" dur="1000" fill="hold"/>
-                                        <p:tgtEl>
-                                          <p:spTgt spid="6"/>
-                                        </p:tgtEl>
-                                        <p:attrNameLst>
-                                          <p:attrName>ppt_y</p:attrName>
-                                        </p:attrNameLst>
-                                      </p:cBhvr>
-                                      <p:tavLst>
-                                        <p:tav tm="0">
-                                          <p:val>
-                                            <p:strVal val="1+#ppt_h/2"/>
-                                          </p:val>
-                                        </p:tav>
-                                        <p:tav tm="100000">
-                                          <p:val>
-                                            <p:strVal val="#ppt_y"/>
-                                          </p:val>
-                                        </p:tav>
-                                      </p:tavLst>
-                                    </p:anim>
-                                  </p:childTnLst>
-                                </p:cTn>
-                              </p:par>
-                              <p:par>
-                                <p:cTn id="15" presetID="2" presetClass="entr" presetSubtype="4" fill="hold" nodeType="withEffect">
-                                  <p:stCondLst>
-                                    <p:cond delay="1000"/>
-                                  </p:stCondLst>
-                                  <p:childTnLst>
-                                    <p:set>
-                                      <p:cBhvr>
-                                        <p:cTn id="16" dur="1" fill="hold">
-                                          <p:stCondLst>
-                                            <p:cond delay="0"/>
-                                          </p:stCondLst>
-                                        </p:cTn>
-                                        <p:tgtEl>
-                                          <p:spTgt spid="5"/>
-                                        </p:tgtEl>
-                                        <p:attrNameLst>
-                                          <p:attrName>style.visibility</p:attrName>
-                                        </p:attrNameLst>
-                                      </p:cBhvr>
-                                      <p:to>
-                                        <p:strVal val="visible"/>
-                                      </p:to>
-                                    </p:set>
-                                    <p:anim calcmode="lin" valueType="num">
-                                      <p:cBhvr additive="base">
-                                        <p:cTn id="17" dur="1000" fill="hold"/>
-                                        <p:tgtEl>
-                                          <p:spTgt spid="5"/>
-                                        </p:tgtEl>
-                                        <p:attrNameLst>
-                                          <p:attrName>ppt_x</p:attrName>
-                                        </p:attrNameLst>
-                                      </p:cBhvr>
-                                      <p:tavLst>
-                                        <p:tav tm="0">
-                                          <p:val>
-                                            <p:strVal val="#ppt_x"/>
-                                          </p:val>
-                                        </p:tav>
-                                        <p:tav tm="100000">
-                                          <p:val>
-                                            <p:strVal val="#ppt_x"/>
-                                          </p:val>
-                                        </p:tav>
-                                      </p:tavLst>
-                                    </p:anim>
-                                    <p:anim calcmode="lin" valueType="num">
-                                      <p:cBhvr additive="base">
-                                        <p:cTn id="18" dur="1000" fill="hold"/>
-                                        <p:tgtEl>
-                                          <p:spTgt spid="5"/>
-                                        </p:tgtEl>
-                                        <p:attrNameLst>
-                                          <p:attrName>ppt_y</p:attrName>
-                                        </p:attrNameLst>
-                                      </p:cBhvr>
-                                      <p:tavLst>
-                                        <p:tav tm="0">
-                                          <p:val>
-                                            <p:strVal val="1+#ppt_h/2"/>
-                                          </p:val>
-                                        </p:tav>
-                                        <p:tav tm="100000">
-                                          <p:val>
-                                            <p:strVal val="#ppt_y"/>
-                                          </p:val>
-                                        </p:tav>
-                                      </p:tavLst>
-                                    </p:anim>
-                                  </p:childTnLst>
-                                </p:cTn>
-                              </p:par>
-                              <p:par>
-                                <p:cTn id="19" presetID="2" presetClass="entr" presetSubtype="4" fill="hold" nodeType="withEffect">
-                                  <p:stCondLst>
-                                    <p:cond delay="1500"/>
-                                  </p:stCondLst>
-                                  <p:childTnLst>
-                                    <p:set>
-                                      <p:cBhvr>
-                                        <p:cTn id="20" dur="1" fill="hold">
-                                          <p:stCondLst>
-                                            <p:cond delay="0"/>
-                                          </p:stCondLst>
-                                        </p:cTn>
-                                        <p:tgtEl>
-                                          <p:spTgt spid="8"/>
-                                        </p:tgtEl>
-                                        <p:attrNameLst>
-                                          <p:attrName>style.visibility</p:attrName>
-                                        </p:attrNameLst>
-                                      </p:cBhvr>
-                                      <p:to>
-                                        <p:strVal val="visible"/>
-                                      </p:to>
-                                    </p:set>
-                                    <p:anim calcmode="lin" valueType="num">
-                                      <p:cBhvr additive="base">
-                                        <p:cTn id="21" dur="1000" fill="hold"/>
-                                        <p:tgtEl>
-                                          <p:spTgt spid="8"/>
-                                        </p:tgtEl>
-                                        <p:attrNameLst>
-                                          <p:attrName>ppt_x</p:attrName>
-                                        </p:attrNameLst>
-                                      </p:cBhvr>
-                                      <p:tavLst>
-                                        <p:tav tm="0">
-                                          <p:val>
-                                            <p:strVal val="#ppt_x"/>
-                                          </p:val>
-                                        </p:tav>
-                                        <p:tav tm="100000">
-                                          <p:val>
-                                            <p:strVal val="#ppt_x"/>
-                                          </p:val>
-                                        </p:tav>
-                                      </p:tavLst>
-                                    </p:anim>
-                                    <p:anim calcmode="lin" valueType="num">
-                                      <p:cBhvr additive="base">
-                                        <p:cTn id="22" dur="1000" fill="hold"/>
-                                        <p:tgtEl>
-                                          <p:spTgt spid="8"/>
-                                        </p:tgtEl>
-                                        <p:attrNameLst>
-                                          <p:attrName>ppt_y</p:attrName>
-                                        </p:attrNameLst>
-                                      </p:cBhvr>
-                                      <p:tavLst>
-                                        <p:tav tm="0">
-                                          <p:val>
-                                            <p:strVal val="1+#ppt_h/2"/>
-                                          </p:val>
-                                        </p:tav>
-                                        <p:tav tm="100000">
-                                          <p:val>
-                                            <p:strVal val="#ppt_y"/>
-                                          </p:val>
-                                        </p:tav>
-                                      </p:tavLst>
-                                    </p:anim>
-                                  </p:childTnLst>
-                                </p:cTn>
-                              </p:par>
-                              <p:par>
-                                <p:cTn id="23" presetID="2" presetClass="entr" presetSubtype="4" fill="hold" nodeType="withEffect">
-                                  <p:stCondLst>
-                                    <p:cond delay="2000"/>
-                                  </p:stCondLst>
-                                  <p:childTnLst>
-                                    <p:set>
-                                      <p:cBhvr>
-                                        <p:cTn id="24" dur="1" fill="hold">
-                                          <p:stCondLst>
-                                            <p:cond delay="0"/>
-                                          </p:stCondLst>
-                                        </p:cTn>
-                                        <p:tgtEl>
-                                          <p:spTgt spid="7"/>
-                                        </p:tgtEl>
-                                        <p:attrNameLst>
-                                          <p:attrName>style.visibility</p:attrName>
-                                        </p:attrNameLst>
-                                      </p:cBhvr>
-                                      <p:to>
-                                        <p:strVal val="visible"/>
-                                      </p:to>
-                                    </p:set>
-                                    <p:anim calcmode="lin" valueType="num">
-                                      <p:cBhvr additive="base">
-                                        <p:cTn id="25" dur="1000" fill="hold"/>
-                                        <p:tgtEl>
-                                          <p:spTgt spid="7"/>
-                                        </p:tgtEl>
-                                        <p:attrNameLst>
-                                          <p:attrName>ppt_x</p:attrName>
-                                        </p:attrNameLst>
-                                      </p:cBhvr>
-                                      <p:tavLst>
-                                        <p:tav tm="0">
-                                          <p:val>
-                                            <p:strVal val="#ppt_x"/>
-                                          </p:val>
-                                        </p:tav>
-                                        <p:tav tm="100000">
-                                          <p:val>
-                                            <p:strVal val="#ppt_x"/>
-                                          </p:val>
-                                        </p:tav>
-                                      </p:tavLst>
-                                    </p:anim>
-                                    <p:anim calcmode="lin" valueType="num">
-                                      <p:cBhvr additive="base">
-                                        <p:cTn id="26" dur="1000" fill="hold"/>
-                                        <p:tgtEl>
-                                          <p:spTgt spid="7"/>
-                                        </p:tgtEl>
-                                        <p:attrNameLst>
-                                          <p:attrName>ppt_y</p:attrName>
-                                        </p:attrNameLst>
-                                      </p:cBhvr>
-                                      <p:tavLst>
-                                        <p:tav tm="0">
-                                          <p:val>
-                                            <p:strVal val="1+#ppt_h/2"/>
-                                          </p:val>
-                                        </p:tav>
-                                        <p:tav tm="100000">
-                                          <p:val>
-                                            <p:strVal val="#ppt_y"/>
-                                          </p:val>
-                                        </p:tav>
-                                      </p:tavLst>
-                                    </p:anim>
-                                  </p:childTnLst>
-                                </p:cTn>
-                              </p:par>
-                            </p:childTnLst>
-                          </p:cTn>
-                        </p:par>
-                      </p:childTnLst>
-                    </p:cTn>
-                  </p:par>
-                  <p:par>
-                    <p:cTn id="27" fill="hold">
-                      <p:stCondLst>
-                        <p:cond delay="indefinite"/>
-                      </p:stCondLst>
-                      <p:childTnLst>
-                        <p:par>
-                          <p:cTn id="28" fill="hold">
-                            <p:stCondLst>
-                              <p:cond delay="0"/>
-                            </p:stCondLst>
-                            <p:childTnLst>
-                              <p:par>
-                                <p:cTn id="29" presetID="14" presetClass="exit" presetSubtype="10" fill="hold" grpId="1" nodeType="clickEffect">
+                                <p:cTn id="27" presetID="14" presetClass="exit" presetSubtype="10" fill="hold" grpId="1" nodeType="clickEffect">
                                   <p:stCondLst>
                                     <p:cond delay="0"/>
                                   </p:stCondLst>
                                   <p:childTnLst>
                                     <p:animEffect transition="out" filter="randombar(horizontal)">
                                       <p:cBhvr>
-                                        <p:cTn id="30" dur="1000"/>
+                                        <p:cTn id="28" dur="1000"/>
                                         <p:tgtEl>
                                           <p:spTgt spid="4"/>
                                         </p:tgtEl>
@@ -12551,7 +12358,7 @@
                                     </p:animEffect>
                                     <p:set>
                                       <p:cBhvr>
-                                        <p:cTn id="31" dur="1" fill="hold">
+                                        <p:cTn id="29" dur="1" fill="hold">
                                           <p:stCondLst>
                                             <p:cond delay="999"/>
                                           </p:stCondLst>
@@ -12571,14 +12378,14 @@
                                 </p:cTn>
                               </p:par>
                               <p:par>
-                                <p:cTn id="32" presetID="14" presetClass="exit" presetSubtype="10" fill="hold" nodeType="withEffect">
+                                <p:cTn id="30" presetID="14" presetClass="exit" presetSubtype="10" fill="hold" nodeType="withEffect">
                                   <p:stCondLst>
                                     <p:cond delay="0"/>
                                   </p:stCondLst>
                                   <p:childTnLst>
                                     <p:animEffect transition="out" filter="randombar(horizontal)">
                                       <p:cBhvr>
-                                        <p:cTn id="33" dur="1000"/>
+                                        <p:cTn id="31" dur="1000"/>
                                         <p:tgtEl>
                                           <p:spTgt spid="6"/>
                                         </p:tgtEl>
@@ -12586,7 +12393,7 @@
                                     </p:animEffect>
                                     <p:set>
                                       <p:cBhvr>
-                                        <p:cTn id="34" dur="1" fill="hold">
+                                        <p:cTn id="32" dur="1" fill="hold">
                                           <p:stCondLst>
                                             <p:cond delay="999"/>
                                           </p:stCondLst>
@@ -12606,14 +12413,14 @@
                                 </p:cTn>
                               </p:par>
                               <p:par>
-                                <p:cTn id="35" presetID="14" presetClass="exit" presetSubtype="10" fill="hold" nodeType="withEffect">
+                                <p:cTn id="33" presetID="14" presetClass="exit" presetSubtype="10" fill="hold" nodeType="withEffect">
                                   <p:stCondLst>
                                     <p:cond delay="0"/>
                                   </p:stCondLst>
                                   <p:childTnLst>
                                     <p:animEffect transition="out" filter="randombar(horizontal)">
                                       <p:cBhvr>
-                                        <p:cTn id="36" dur="1000"/>
+                                        <p:cTn id="34" dur="1000"/>
                                         <p:tgtEl>
                                           <p:spTgt spid="5"/>
                                         </p:tgtEl>
@@ -12621,7 +12428,7 @@
                                     </p:animEffect>
                                     <p:set>
                                       <p:cBhvr>
-                                        <p:cTn id="37" dur="1" fill="hold">
+                                        <p:cTn id="35" dur="1" fill="hold">
                                           <p:stCondLst>
                                             <p:cond delay="999"/>
                                           </p:stCondLst>
@@ -12641,14 +12448,14 @@
                                 </p:cTn>
                               </p:par>
                               <p:par>
-                                <p:cTn id="38" presetID="14" presetClass="exit" presetSubtype="10" fill="hold" nodeType="withEffect">
+                                <p:cTn id="36" presetID="14" presetClass="exit" presetSubtype="10" fill="hold" nodeType="withEffect">
                                   <p:stCondLst>
                                     <p:cond delay="0"/>
                                   </p:stCondLst>
                                   <p:childTnLst>
                                     <p:animEffect transition="out" filter="randombar(horizontal)">
                                       <p:cBhvr>
-                                        <p:cTn id="39" dur="1000"/>
+                                        <p:cTn id="37" dur="1000"/>
                                         <p:tgtEl>
                                           <p:spTgt spid="8"/>
                                         </p:tgtEl>
@@ -12656,7 +12463,7 @@
                                     </p:animEffect>
                                     <p:set>
                                       <p:cBhvr>
-                                        <p:cTn id="40" dur="1" fill="hold">
+                                        <p:cTn id="38" dur="1" fill="hold">
                                           <p:stCondLst>
                                             <p:cond delay="999"/>
                                           </p:stCondLst>
@@ -12676,14 +12483,14 @@
                                 </p:cTn>
                               </p:par>
                               <p:par>
-                                <p:cTn id="41" presetID="14" presetClass="exit" presetSubtype="10" fill="hold" nodeType="withEffect">
+                                <p:cTn id="39" presetID="14" presetClass="exit" presetSubtype="10" fill="hold" nodeType="withEffect">
                                   <p:stCondLst>
                                     <p:cond delay="0"/>
                                   </p:stCondLst>
                                   <p:childTnLst>
                                     <p:animEffect transition="out" filter="randombar(horizontal)">
                                       <p:cBhvr>
-                                        <p:cTn id="42" dur="1000"/>
+                                        <p:cTn id="40" dur="1000"/>
                                         <p:tgtEl>
                                           <p:spTgt spid="7"/>
                                         </p:tgtEl>
@@ -12691,7 +12498,7 @@
                                     </p:animEffect>
                                     <p:set>
                                       <p:cBhvr>
-                                        <p:cTn id="43" dur="1" fill="hold">
+                                        <p:cTn id="41" dur="1" fill="hold">
                                           <p:stCondLst>
                                             <p:cond delay="999"/>
                                           </p:stCondLst>
@@ -12882,7 +12689,7 @@
           <p:cNvPr id="4" name="Title 1">
             <a:extLst>
               <a:ext uri="{FF2B5EF4-FFF2-40B4-BE49-F238E27FC236}">
-                <a16:creationId xmlns:a16="http://schemas.microsoft.com/office/drawing/2014/main" xmlns="" id="{9DE94162-323C-48DA-8B52-07C80BAC06EE}"/>
+                <a16:creationId xmlns="" xmlns:a16="http://schemas.microsoft.com/office/drawing/2014/main" id="{9DE94162-323C-48DA-8B52-07C80BAC06EE}"/>
               </a:ext>
             </a:extLst>
           </p:cNvPr>
@@ -13166,6 +12973,9 @@
                     <p:cTn id="3" fill="hold">
                       <p:stCondLst>
                         <p:cond delay="indefinite"/>
+                        <p:cond evt="onBegin" delay="0">
+                          <p:tn val="2"/>
+                        </p:cond>
                       </p:stCondLst>
                       <p:childTnLst>
                         <p:par>
@@ -13175,7 +12985,7 @@
                             </p:stCondLst>
                             <p:childTnLst>
                               <p:par>
-                                <p:cTn id="5" presetID="2" presetClass="entr" presetSubtype="4" fill="hold" grpId="0" nodeType="clickEffect">
+                                <p:cTn id="5" presetID="2" presetClass="entr" presetSubtype="4" fill="hold" grpId="0" nodeType="withEffect">
                                   <p:stCondLst>
                                     <p:cond delay="0"/>
                                   </p:stCondLst>
@@ -14014,7 +13824,7 @@
           <p:cNvPr id="3" name="Title 1">
             <a:extLst>
               <a:ext uri="{FF2B5EF4-FFF2-40B4-BE49-F238E27FC236}">
-                <a16:creationId xmlns:a16="http://schemas.microsoft.com/office/drawing/2014/main" xmlns="" id="{9DE94162-323C-48DA-8B52-07C80BAC06EE}"/>
+                <a16:creationId xmlns="" xmlns:a16="http://schemas.microsoft.com/office/drawing/2014/main" id="{9DE94162-323C-48DA-8B52-07C80BAC06EE}"/>
               </a:ext>
             </a:extLst>
           </p:cNvPr>
@@ -14284,6 +14094,9 @@
                     <p:cTn id="3" fill="hold">
                       <p:stCondLst>
                         <p:cond delay="indefinite"/>
+                        <p:cond evt="onBegin" delay="0">
+                          <p:tn val="2"/>
+                        </p:cond>
                       </p:stCondLst>
                       <p:childTnLst>
                         <p:par>
@@ -14293,7 +14106,7 @@
                             </p:stCondLst>
                             <p:childTnLst>
                               <p:par>
-                                <p:cTn id="5" presetID="2" presetClass="entr" presetSubtype="4" fill="hold" grpId="0" nodeType="clickEffect">
+                                <p:cTn id="5" presetID="2" presetClass="entr" presetSubtype="4" fill="hold" grpId="0" nodeType="withEffect">
                                   <p:stCondLst>
                                     <p:cond delay="0"/>
                                   </p:stCondLst>
@@ -14365,33 +14178,15 @@
                                   </p:childTnLst>
                                 </p:cTn>
                               </p:par>
-                            </p:childTnLst>
-                          </p:cTn>
-                        </p:par>
-                      </p:childTnLst>
-                    </p:cTn>
-                  </p:par>
-                  <p:par>
-                    <p:cTn id="9" fill="hold">
-                      <p:stCondLst>
-                        <p:cond delay="indefinite"/>
-                      </p:stCondLst>
-                      <p:childTnLst>
-                        <p:par>
-                          <p:cTn id="10" fill="hold">
-                            <p:stCondLst>
-                              <p:cond delay="0"/>
-                            </p:stCondLst>
-                            <p:childTnLst>
                               <p:par>
-                                <p:cTn id="11" presetID="42" presetClass="entr" presetSubtype="0" fill="hold" nodeType="clickEffect">
+                                <p:cTn id="9" presetID="42" presetClass="entr" presetSubtype="0" fill="hold" nodeType="withEffect">
                                   <p:stCondLst>
                                     <p:cond delay="1000"/>
                                   </p:stCondLst>
                                   <p:childTnLst>
                                     <p:set>
                                       <p:cBhvr>
-                                        <p:cTn id="12" dur="1" fill="hold">
+                                        <p:cTn id="10" dur="1" fill="hold">
                                           <p:stCondLst>
                                             <p:cond delay="0"/>
                                           </p:stCondLst>
@@ -14409,7 +14204,7 @@
                                     </p:set>
                                     <p:animEffect transition="in" filter="fade">
                                       <p:cBhvr>
-                                        <p:cTn id="13" dur="1000"/>
+                                        <p:cTn id="11" dur="1000"/>
                                         <p:tgtEl>
                                           <p:spTgt spid="6"/>
                                         </p:tgtEl>
@@ -14417,7 +14212,7 @@
                                     </p:animEffect>
                                     <p:anim calcmode="lin" valueType="num">
                                       <p:cBhvr>
-                                        <p:cTn id="14" dur="1000" fill="hold"/>
+                                        <p:cTn id="12" dur="1000" fill="hold"/>
                                         <p:tgtEl>
                                           <p:spTgt spid="6"/>
                                         </p:tgtEl>
@@ -14440,7 +14235,7 @@
                                     </p:anim>
                                     <p:anim calcmode="lin" valueType="num">
                                       <p:cBhvr>
-                                        <p:cTn id="15" dur="1000" fill="hold"/>
+                                        <p:cTn id="13" dur="1000" fill="hold"/>
                                         <p:tgtEl>
                                           <p:spTgt spid="6"/>
                                         </p:tgtEl>
@@ -14465,14 +14260,14 @@
                                 </p:cTn>
                               </p:par>
                               <p:par>
-                                <p:cTn id="16" presetID="42" presetClass="entr" presetSubtype="0" fill="hold" nodeType="withEffect">
+                                <p:cTn id="14" presetID="42" presetClass="entr" presetSubtype="0" fill="hold" nodeType="withEffect">
                                   <p:stCondLst>
                                     <p:cond delay="1500"/>
                                   </p:stCondLst>
                                   <p:childTnLst>
                                     <p:set>
                                       <p:cBhvr>
-                                        <p:cTn id="17" dur="1" fill="hold">
+                                        <p:cTn id="15" dur="1" fill="hold">
                                           <p:stCondLst>
                                             <p:cond delay="0"/>
                                           </p:stCondLst>
@@ -14490,7 +14285,7 @@
                                     </p:set>
                                     <p:animEffect transition="in" filter="fade">
                                       <p:cBhvr>
-                                        <p:cTn id="18" dur="1000"/>
+                                        <p:cTn id="16" dur="1000"/>
                                         <p:tgtEl>
                                           <p:spTgt spid="7"/>
                                         </p:tgtEl>
@@ -14498,7 +14293,7 @@
                                     </p:animEffect>
                                     <p:anim calcmode="lin" valueType="num">
                                       <p:cBhvr>
-                                        <p:cTn id="19" dur="1000" fill="hold"/>
+                                        <p:cTn id="17" dur="1000" fill="hold"/>
                                         <p:tgtEl>
                                           <p:spTgt spid="7"/>
                                         </p:tgtEl>
@@ -14521,7 +14316,7 @@
                                     </p:anim>
                                     <p:anim calcmode="lin" valueType="num">
                                       <p:cBhvr>
-                                        <p:cTn id="20" dur="1000" fill="hold"/>
+                                        <p:cTn id="18" dur="1000" fill="hold"/>
                                         <p:tgtEl>
                                           <p:spTgt spid="7"/>
                                         </p:tgtEl>
@@ -14552,26 +14347,26 @@
                     </p:cTn>
                   </p:par>
                   <p:par>
-                    <p:cTn id="21" fill="hold">
+                    <p:cTn id="19" fill="hold">
                       <p:stCondLst>
                         <p:cond delay="indefinite"/>
                       </p:stCondLst>
                       <p:childTnLst>
                         <p:par>
-                          <p:cTn id="22" fill="hold">
+                          <p:cTn id="20" fill="hold">
                             <p:stCondLst>
                               <p:cond delay="0"/>
                             </p:stCondLst>
                             <p:childTnLst>
                               <p:par>
-                                <p:cTn id="23" presetID="14" presetClass="exit" presetSubtype="10" fill="hold" grpId="1" nodeType="clickEffect">
+                                <p:cTn id="21" presetID="14" presetClass="exit" presetSubtype="10" fill="hold" grpId="1" nodeType="clickEffect">
                                   <p:stCondLst>
                                     <p:cond delay="0"/>
                                   </p:stCondLst>
                                   <p:childTnLst>
                                     <p:animEffect transition="out" filter="randombar(horizontal)">
                                       <p:cBhvr>
-                                        <p:cTn id="24" dur="1000"/>
+                                        <p:cTn id="22" dur="1000"/>
                                         <p:tgtEl>
                                           <p:spTgt spid="3"/>
                                         </p:tgtEl>
@@ -14579,7 +14374,7 @@
                                     </p:animEffect>
                                     <p:set>
                                       <p:cBhvr>
-                                        <p:cTn id="25" dur="1" fill="hold">
+                                        <p:cTn id="23" dur="1" fill="hold">
                                           <p:stCondLst>
                                             <p:cond delay="999"/>
                                           </p:stCondLst>
@@ -14599,14 +14394,14 @@
                                 </p:cTn>
                               </p:par>
                               <p:par>
-                                <p:cTn id="26" presetID="14" presetClass="exit" presetSubtype="10" fill="hold" nodeType="withEffect">
+                                <p:cTn id="24" presetID="14" presetClass="exit" presetSubtype="10" fill="hold" nodeType="withEffect">
                                   <p:stCondLst>
                                     <p:cond delay="0"/>
                                   </p:stCondLst>
                                   <p:childTnLst>
                                     <p:animEffect transition="out" filter="randombar(horizontal)">
                                       <p:cBhvr>
-                                        <p:cTn id="27" dur="1000"/>
+                                        <p:cTn id="25" dur="1000"/>
                                         <p:tgtEl>
                                           <p:spTgt spid="6"/>
                                         </p:tgtEl>
@@ -14614,7 +14409,7 @@
                                     </p:animEffect>
                                     <p:set>
                                       <p:cBhvr>
-                                        <p:cTn id="28" dur="1" fill="hold">
+                                        <p:cTn id="26" dur="1" fill="hold">
                                           <p:stCondLst>
                                             <p:cond delay="999"/>
                                           </p:stCondLst>
@@ -14634,14 +14429,14 @@
                                 </p:cTn>
                               </p:par>
                               <p:par>
-                                <p:cTn id="29" presetID="14" presetClass="exit" presetSubtype="10" fill="hold" nodeType="withEffect">
+                                <p:cTn id="27" presetID="14" presetClass="exit" presetSubtype="10" fill="hold" nodeType="withEffect">
                                   <p:stCondLst>
                                     <p:cond delay="0"/>
                                   </p:stCondLst>
                                   <p:childTnLst>
                                     <p:animEffect transition="out" filter="randombar(horizontal)">
                                       <p:cBhvr>
-                                        <p:cTn id="30" dur="1000"/>
+                                        <p:cTn id="28" dur="1000"/>
                                         <p:tgtEl>
                                           <p:spTgt spid="7"/>
                                         </p:tgtEl>
@@ -14649,7 +14444,7 @@
                                     </p:animEffect>
                                     <p:set>
                                       <p:cBhvr>
-                                        <p:cTn id="31" dur="1" fill="hold">
+                                        <p:cTn id="29" dur="1" fill="hold">
                                           <p:stCondLst>
                                             <p:cond delay="999"/>
                                           </p:stCondLst>
@@ -14734,7 +14529,7 @@
           <p:cNvPr id="2" name="Title 1">
             <a:extLst>
               <a:ext uri="{FF2B5EF4-FFF2-40B4-BE49-F238E27FC236}">
-                <a16:creationId xmlns:a16="http://schemas.microsoft.com/office/drawing/2014/main" xmlns="" id="{9DE94162-323C-48DA-8B52-07C80BAC06EE}"/>
+                <a16:creationId xmlns="" xmlns:a16="http://schemas.microsoft.com/office/drawing/2014/main" id="{9DE94162-323C-48DA-8B52-07C80BAC06EE}"/>
               </a:ext>
             </a:extLst>
           </p:cNvPr>
@@ -15044,6 +14839,9 @@
                     <p:cTn id="3" fill="hold">
                       <p:stCondLst>
                         <p:cond delay="indefinite"/>
+                        <p:cond evt="onBegin" delay="0">
+                          <p:tn val="2"/>
+                        </p:cond>
                       </p:stCondLst>
                       <p:childTnLst>
                         <p:par>
@@ -15053,7 +14851,7 @@
                             </p:stCondLst>
                             <p:childTnLst>
                               <p:par>
-                                <p:cTn id="5" presetID="2" presetClass="entr" presetSubtype="4" fill="hold" grpId="0" nodeType="clickEffect">
+                                <p:cTn id="5" presetID="2" presetClass="entr" presetSubtype="4" fill="hold" grpId="0" nodeType="withEffect">
                                   <p:stCondLst>
                                     <p:cond delay="0"/>
                                   </p:stCondLst>
@@ -15125,33 +14923,15 @@
                                   </p:childTnLst>
                                 </p:cTn>
                               </p:par>
-                            </p:childTnLst>
-                          </p:cTn>
-                        </p:par>
-                      </p:childTnLst>
-                    </p:cTn>
-                  </p:par>
-                  <p:par>
-                    <p:cTn id="9" fill="hold">
-                      <p:stCondLst>
-                        <p:cond delay="indefinite"/>
-                      </p:stCondLst>
-                      <p:childTnLst>
-                        <p:par>
-                          <p:cTn id="10" fill="hold">
-                            <p:stCondLst>
-                              <p:cond delay="0"/>
-                            </p:stCondLst>
-                            <p:childTnLst>
                               <p:par>
-                                <p:cTn id="11" presetID="22" presetClass="entr" presetSubtype="4" fill="hold" nodeType="clickEffect">
+                                <p:cTn id="9" presetID="22" presetClass="entr" presetSubtype="4" fill="hold" nodeType="withEffect">
                                   <p:stCondLst>
-                                    <p:cond delay="2000"/>
+                                    <p:cond delay="1000"/>
                                   </p:stCondLst>
                                   <p:childTnLst>
                                     <p:set>
                                       <p:cBhvr>
-                                        <p:cTn id="12" dur="1" fill="hold">
+                                        <p:cTn id="10" dur="1" fill="hold">
                                           <p:stCondLst>
                                             <p:cond delay="0"/>
                                           </p:stCondLst>
@@ -15169,7 +14949,7 @@
                                     </p:set>
                                     <p:animEffect transition="in" filter="wipe(down)">
                                       <p:cBhvr>
-                                        <p:cTn id="13" dur="1000"/>
+                                        <p:cTn id="11" dur="1000"/>
                                         <p:tgtEl>
                                           <p:spTgt spid="8"/>
                                         </p:tgtEl>
@@ -15179,14 +14959,14 @@
                                 </p:cTn>
                               </p:par>
                               <p:par>
-                                <p:cTn id="14" presetID="22" presetClass="entr" presetSubtype="4" fill="hold" nodeType="withEffect">
+                                <p:cTn id="12" presetID="22" presetClass="entr" presetSubtype="4" fill="hold" nodeType="withEffect">
                                   <p:stCondLst>
                                     <p:cond delay="1500"/>
                                   </p:stCondLst>
                                   <p:childTnLst>
                                     <p:set>
                                       <p:cBhvr>
-                                        <p:cTn id="15" dur="1" fill="hold">
+                                        <p:cTn id="13" dur="1" fill="hold">
                                           <p:stCondLst>
                                             <p:cond delay="0"/>
                                           </p:stCondLst>
@@ -15204,7 +14984,7 @@
                                     </p:set>
                                     <p:animEffect transition="in" filter="wipe(down)">
                                       <p:cBhvr>
-                                        <p:cTn id="16" dur="1000"/>
+                                        <p:cTn id="14" dur="1000"/>
                                         <p:tgtEl>
                                           <p:spTgt spid="5"/>
                                         </p:tgtEl>
@@ -15220,26 +15000,26 @@
                     </p:cTn>
                   </p:par>
                   <p:par>
-                    <p:cTn id="17" fill="hold">
+                    <p:cTn id="15" fill="hold">
                       <p:stCondLst>
                         <p:cond delay="indefinite"/>
                       </p:stCondLst>
                       <p:childTnLst>
                         <p:par>
-                          <p:cTn id="18" fill="hold">
+                          <p:cTn id="16" fill="hold">
                             <p:stCondLst>
                               <p:cond delay="0"/>
                             </p:stCondLst>
                             <p:childTnLst>
                               <p:par>
-                                <p:cTn id="19" presetID="14" presetClass="exit" presetSubtype="10" fill="hold" grpId="1" nodeType="clickEffect">
+                                <p:cTn id="17" presetID="14" presetClass="exit" presetSubtype="10" fill="hold" grpId="1" nodeType="clickEffect">
                                   <p:stCondLst>
                                     <p:cond delay="0"/>
                                   </p:stCondLst>
                                   <p:childTnLst>
                                     <p:animEffect transition="out" filter="randombar(horizontal)">
                                       <p:cBhvr>
-                                        <p:cTn id="20" dur="1000"/>
+                                        <p:cTn id="18" dur="1000"/>
                                         <p:tgtEl>
                                           <p:spTgt spid="2"/>
                                         </p:tgtEl>
@@ -15247,7 +15027,7 @@
                                     </p:animEffect>
                                     <p:set>
                                       <p:cBhvr>
-                                        <p:cTn id="21" dur="1" fill="hold">
+                                        <p:cTn id="19" dur="1" fill="hold">
                                           <p:stCondLst>
                                             <p:cond delay="999"/>
                                           </p:stCondLst>
@@ -15267,14 +15047,14 @@
                                 </p:cTn>
                               </p:par>
                               <p:par>
-                                <p:cTn id="22" presetID="14" presetClass="exit" presetSubtype="10" fill="hold" nodeType="withEffect">
+                                <p:cTn id="20" presetID="14" presetClass="exit" presetSubtype="10" fill="hold" nodeType="withEffect">
                                   <p:stCondLst>
                                     <p:cond delay="0"/>
                                   </p:stCondLst>
                                   <p:childTnLst>
                                     <p:animEffect transition="out" filter="randombar(horizontal)">
                                       <p:cBhvr>
-                                        <p:cTn id="23" dur="1000"/>
+                                        <p:cTn id="21" dur="1000"/>
                                         <p:tgtEl>
                                           <p:spTgt spid="5"/>
                                         </p:tgtEl>
@@ -15282,7 +15062,7 @@
                                     </p:animEffect>
                                     <p:set>
                                       <p:cBhvr>
-                                        <p:cTn id="24" dur="1" fill="hold">
+                                        <p:cTn id="22" dur="1" fill="hold">
                                           <p:stCondLst>
                                             <p:cond delay="999"/>
                                           </p:stCondLst>
@@ -15302,14 +15082,14 @@
                                 </p:cTn>
                               </p:par>
                               <p:par>
-                                <p:cTn id="25" presetID="14" presetClass="exit" presetSubtype="10" fill="hold" nodeType="withEffect">
+                                <p:cTn id="23" presetID="14" presetClass="exit" presetSubtype="10" fill="hold" nodeType="withEffect">
                                   <p:stCondLst>
                                     <p:cond delay="0"/>
                                   </p:stCondLst>
                                   <p:childTnLst>
                                     <p:animEffect transition="out" filter="randombar(horizontal)">
                                       <p:cBhvr>
-                                        <p:cTn id="26" dur="1000"/>
+                                        <p:cTn id="24" dur="1000"/>
                                         <p:tgtEl>
                                           <p:spTgt spid="8"/>
                                         </p:tgtEl>
@@ -15317,7 +15097,7 @@
                                     </p:animEffect>
                                     <p:set>
                                       <p:cBhvr>
-                                        <p:cTn id="27" dur="1" fill="hold">
+                                        <p:cTn id="25" dur="1" fill="hold">
                                           <p:stCondLst>
                                             <p:cond delay="999"/>
                                           </p:stCondLst>
@@ -15402,7 +15182,7 @@
           <p:cNvPr id="2" name="Title 1">
             <a:extLst>
               <a:ext uri="{FF2B5EF4-FFF2-40B4-BE49-F238E27FC236}">
-                <a16:creationId xmlns:a16="http://schemas.microsoft.com/office/drawing/2014/main" xmlns="" id="{9DE94162-323C-48DA-8B52-07C80BAC06EE}"/>
+                <a16:creationId xmlns="" xmlns:a16="http://schemas.microsoft.com/office/drawing/2014/main" id="{9DE94162-323C-48DA-8B52-07C80BAC06EE}"/>
               </a:ext>
             </a:extLst>
           </p:cNvPr>
@@ -15660,6 +15440,9 @@
                     <p:cTn id="3" fill="hold">
                       <p:stCondLst>
                         <p:cond delay="indefinite"/>
+                        <p:cond evt="onBegin" delay="0">
+                          <p:tn val="2"/>
+                        </p:cond>
                       </p:stCondLst>
                       <p:childTnLst>
                         <p:par>
@@ -15669,7 +15452,7 @@
                             </p:stCondLst>
                             <p:childTnLst>
                               <p:par>
-                                <p:cTn id="5" presetID="2" presetClass="entr" presetSubtype="4" fill="hold" grpId="0" nodeType="clickEffect">
+                                <p:cTn id="5" presetID="2" presetClass="entr" presetSubtype="4" fill="hold" grpId="0" nodeType="withEffect">
                                   <p:stCondLst>
                                     <p:cond delay="0"/>
                                   </p:stCondLst>
@@ -15741,33 +15524,15 @@
                                   </p:childTnLst>
                                 </p:cTn>
                               </p:par>
-                            </p:childTnLst>
-                          </p:cTn>
-                        </p:par>
-                      </p:childTnLst>
-                    </p:cTn>
-                  </p:par>
-                  <p:par>
-                    <p:cTn id="9" fill="hold">
-                      <p:stCondLst>
-                        <p:cond delay="indefinite"/>
-                      </p:stCondLst>
-                      <p:childTnLst>
-                        <p:par>
-                          <p:cTn id="10" fill="hold">
-                            <p:stCondLst>
-                              <p:cond delay="0"/>
-                            </p:stCondLst>
-                            <p:childTnLst>
                               <p:par>
-                                <p:cTn id="11" presetID="22" presetClass="entr" presetSubtype="4" fill="hold" nodeType="clickEffect">
+                                <p:cTn id="9" presetID="22" presetClass="entr" presetSubtype="4" fill="hold" nodeType="withEffect">
                                   <p:stCondLst>
                                     <p:cond delay="1000"/>
                                   </p:stCondLst>
                                   <p:childTnLst>
                                     <p:set>
                                       <p:cBhvr>
-                                        <p:cTn id="12" dur="1" fill="hold">
+                                        <p:cTn id="10" dur="1" fill="hold">
                                           <p:stCondLst>
                                             <p:cond delay="0"/>
                                           </p:stCondLst>
@@ -15785,7 +15550,7 @@
                                     </p:set>
                                     <p:animEffect transition="in" filter="wipe(down)">
                                       <p:cBhvr>
-                                        <p:cTn id="13" dur="1000"/>
+                                        <p:cTn id="11" dur="1000"/>
                                         <p:tgtEl>
                                           <p:spTgt spid="6"/>
                                         </p:tgtEl>
@@ -15801,26 +15566,26 @@
                     </p:cTn>
                   </p:par>
                   <p:par>
-                    <p:cTn id="14" fill="hold">
+                    <p:cTn id="12" fill="hold">
                       <p:stCondLst>
                         <p:cond delay="indefinite"/>
                       </p:stCondLst>
                       <p:childTnLst>
                         <p:par>
-                          <p:cTn id="15" fill="hold">
+                          <p:cTn id="13" fill="hold">
                             <p:stCondLst>
                               <p:cond delay="0"/>
                             </p:stCondLst>
                             <p:childTnLst>
                               <p:par>
-                                <p:cTn id="16" presetID="14" presetClass="exit" presetSubtype="10" fill="hold" grpId="1" nodeType="clickEffect">
+                                <p:cTn id="14" presetID="14" presetClass="exit" presetSubtype="10" fill="hold" grpId="1" nodeType="clickEffect">
                                   <p:stCondLst>
                                     <p:cond delay="0"/>
                                   </p:stCondLst>
                                   <p:childTnLst>
                                     <p:animEffect transition="out" filter="randombar(horizontal)">
                                       <p:cBhvr>
-                                        <p:cTn id="17" dur="1000"/>
+                                        <p:cTn id="15" dur="1000"/>
                                         <p:tgtEl>
                                           <p:spTgt spid="2"/>
                                         </p:tgtEl>
@@ -15828,7 +15593,7 @@
                                     </p:animEffect>
                                     <p:set>
                                       <p:cBhvr>
-                                        <p:cTn id="18" dur="1" fill="hold">
+                                        <p:cTn id="16" dur="1" fill="hold">
                                           <p:stCondLst>
                                             <p:cond delay="999"/>
                                           </p:stCondLst>
@@ -15848,14 +15613,14 @@
                                 </p:cTn>
                               </p:par>
                               <p:par>
-                                <p:cTn id="19" presetID="14" presetClass="exit" presetSubtype="10" fill="hold" nodeType="withEffect">
+                                <p:cTn id="17" presetID="14" presetClass="exit" presetSubtype="10" fill="hold" nodeType="withEffect">
                                   <p:stCondLst>
                                     <p:cond delay="0"/>
                                   </p:stCondLst>
                                   <p:childTnLst>
                                     <p:animEffect transition="out" filter="randombar(horizontal)">
                                       <p:cBhvr>
-                                        <p:cTn id="20" dur="1000"/>
+                                        <p:cTn id="18" dur="1000"/>
                                         <p:tgtEl>
                                           <p:spTgt spid="6"/>
                                         </p:tgtEl>
@@ -15863,7 +15628,7 @@
                                     </p:animEffect>
                                     <p:set>
                                       <p:cBhvr>
-                                        <p:cTn id="21" dur="1" fill="hold">
+                                        <p:cTn id="19" dur="1" fill="hold">
                                           <p:stCondLst>
                                             <p:cond delay="999"/>
                                           </p:stCondLst>
@@ -16527,7 +16292,7 @@
                               <p:par>
                                 <p:cTn id="8" presetID="10" presetClass="entr" presetSubtype="0" fill="hold" nodeType="withEffect">
                                   <p:stCondLst>
-                                    <p:cond delay="2000"/>
+                                    <p:cond delay="1000"/>
                                   </p:stCondLst>
                                   <p:childTnLst>
                                     <p:set>
@@ -16562,7 +16327,7 @@
                               <p:par>
                                 <p:cTn id="11" presetID="10" presetClass="entr" presetSubtype="0" fill="hold" nodeType="withEffect">
                                   <p:stCondLst>
-                                    <p:cond delay="2000"/>
+                                    <p:cond delay="1500"/>
                                   </p:stCondLst>
                                   <p:childTnLst>
                                     <p:set>
@@ -16853,7 +16618,7 @@
           <p:cNvPr id="3" name="Title 1">
             <a:extLst>
               <a:ext uri="{FF2B5EF4-FFF2-40B4-BE49-F238E27FC236}">
-                <a16:creationId xmlns:a16="http://schemas.microsoft.com/office/drawing/2014/main" xmlns="" id="{9DE94162-323C-48DA-8B52-07C80BAC06EE}"/>
+                <a16:creationId xmlns="" xmlns:a16="http://schemas.microsoft.com/office/drawing/2014/main" id="{9DE94162-323C-48DA-8B52-07C80BAC06EE}"/>
               </a:ext>
             </a:extLst>
           </p:cNvPr>
@@ -17110,6 +16875,9 @@
                     <p:cTn id="3" fill="hold">
                       <p:stCondLst>
                         <p:cond delay="indefinite"/>
+                        <p:cond evt="onBegin" delay="0">
+                          <p:tn val="2"/>
+                        </p:cond>
                       </p:stCondLst>
                       <p:childTnLst>
                         <p:par>
@@ -17119,7 +16887,7 @@
                             </p:stCondLst>
                             <p:childTnLst>
                               <p:par>
-                                <p:cTn id="5" presetID="2" presetClass="entr" presetSubtype="4" fill="hold" grpId="0" nodeType="clickEffect">
+                                <p:cTn id="5" presetID="2" presetClass="entr" presetSubtype="4" fill="hold" grpId="0" nodeType="withEffect">
                                   <p:stCondLst>
                                     <p:cond delay="0"/>
                                   </p:stCondLst>
@@ -17310,7 +17078,7 @@
           <p:cNvPr id="4" name="TextBox 3">
             <a:extLst>
               <a:ext uri="{FF2B5EF4-FFF2-40B4-BE49-F238E27FC236}">
-                <a16:creationId xmlns:a16="http://schemas.microsoft.com/office/drawing/2014/main" xmlns="" id="{C542A917-2DC0-41C3-A1A8-3D1A5C65E9C5}"/>
+                <a16:creationId xmlns="" xmlns:a16="http://schemas.microsoft.com/office/drawing/2014/main" id="{C542A917-2DC0-41C3-A1A8-3D1A5C65E9C5}"/>
               </a:ext>
             </a:extLst>
           </p:cNvPr>
@@ -18633,7 +18401,7 @@
                               <p:par>
                                 <p:cTn id="8" presetID="22" presetClass="entr" presetSubtype="4" fill="hold" nodeType="withEffect">
                                   <p:stCondLst>
-                                    <p:cond delay="500"/>
+                                    <p:cond delay="700"/>
                                   </p:stCondLst>
                                   <p:childTnLst>
                                     <p:set>
@@ -18668,7 +18436,7 @@
                               <p:par>
                                 <p:cTn id="11" presetID="22" presetClass="entr" presetSubtype="4" fill="hold" nodeType="withEffect">
                                   <p:stCondLst>
-                                    <p:cond delay="500"/>
+                                    <p:cond delay="900"/>
                                   </p:stCondLst>
                                   <p:childTnLst>
                                     <p:set>
@@ -18703,7 +18471,7 @@
                               <p:par>
                                 <p:cTn id="14" presetID="22" presetClass="entr" presetSubtype="4" fill="hold" grpId="1" nodeType="withEffect">
                                   <p:stCondLst>
-                                    <p:cond delay="500"/>
+                                    <p:cond delay="700"/>
                                   </p:stCondLst>
                                   <p:childTnLst>
                                     <p:set>
@@ -18738,7 +18506,7 @@
                               <p:par>
                                 <p:cTn id="17" presetID="22" presetClass="entr" presetSubtype="4" fill="hold" grpId="1" nodeType="withEffect">
                                   <p:stCondLst>
-                                    <p:cond delay="500"/>
+                                    <p:cond delay="1100"/>
                                   </p:stCondLst>
                                   <p:childTnLst>
                                     <p:set>
@@ -18773,7 +18541,7 @@
                               <p:par>
                                 <p:cTn id="20" presetID="22" presetClass="entr" presetSubtype="4" fill="hold" grpId="0" nodeType="withEffect">
                                   <p:stCondLst>
-                                    <p:cond delay="500"/>
+                                    <p:cond delay="400"/>
                                   </p:stCondLst>
                                   <p:childTnLst>
                                     <p:set>
@@ -19269,7 +19037,7 @@
           <p:cNvPr id="6" name="Title 1">
             <a:extLst>
               <a:ext uri="{FF2B5EF4-FFF2-40B4-BE49-F238E27FC236}">
-                <a16:creationId xmlns:a16="http://schemas.microsoft.com/office/drawing/2014/main" xmlns="" id="{9DE94162-323C-48DA-8B52-07C80BAC06EE}"/>
+                <a16:creationId xmlns="" xmlns:a16="http://schemas.microsoft.com/office/drawing/2014/main" id="{9DE94162-323C-48DA-8B52-07C80BAC06EE}"/>
               </a:ext>
             </a:extLst>
           </p:cNvPr>
@@ -19512,33 +19280,15 @@
                                   </p:childTnLst>
                                 </p:cTn>
                               </p:par>
-                            </p:childTnLst>
-                          </p:cTn>
-                        </p:par>
-                      </p:childTnLst>
-                    </p:cTn>
-                  </p:par>
-                  <p:par>
-                    <p:cTn id="12" fill="hold">
-                      <p:stCondLst>
-                        <p:cond delay="indefinite"/>
-                      </p:stCondLst>
-                      <p:childTnLst>
-                        <p:par>
-                          <p:cTn id="13" fill="hold">
-                            <p:stCondLst>
-                              <p:cond delay="0"/>
-                            </p:stCondLst>
-                            <p:childTnLst>
                               <p:par>
-                                <p:cTn id="14" presetID="2" presetClass="entr" presetSubtype="4" fill="hold" nodeType="clickEffect">
+                                <p:cTn id="12" presetID="2" presetClass="entr" presetSubtype="4" fill="hold" nodeType="withEffect">
                                   <p:stCondLst>
-                                    <p:cond delay="0"/>
+                                    <p:cond delay="1800"/>
                                   </p:stCondLst>
                                   <p:childTnLst>
                                     <p:set>
                                       <p:cBhvr>
-                                        <p:cTn id="15" dur="1" fill="hold">
+                                        <p:cTn id="13" dur="1" fill="hold">
                                           <p:stCondLst>
                                             <p:cond delay="0"/>
                                           </p:stCondLst>
@@ -19556,7 +19306,7 @@
                                     </p:set>
                                     <p:anim calcmode="lin" valueType="num">
                                       <p:cBhvr additive="base">
-                                        <p:cTn id="16" dur="500" fill="hold"/>
+                                        <p:cTn id="14" dur="500" fill="hold"/>
                                         <p:tgtEl>
                                           <p:spTgt spid="3"/>
                                         </p:tgtEl>
@@ -19579,7 +19329,7 @@
                                     </p:anim>
                                     <p:anim calcmode="lin" valueType="num">
                                       <p:cBhvr additive="base">
-                                        <p:cTn id="17" dur="500" fill="hold"/>
+                                        <p:cTn id="15" dur="500" fill="hold"/>
                                         <p:tgtEl>
                                           <p:spTgt spid="3"/>
                                         </p:tgtEl>
@@ -19610,26 +19360,26 @@
                     </p:cTn>
                   </p:par>
                   <p:par>
-                    <p:cTn id="18" fill="hold">
+                    <p:cTn id="16" fill="hold">
                       <p:stCondLst>
                         <p:cond delay="indefinite"/>
                       </p:stCondLst>
                       <p:childTnLst>
                         <p:par>
-                          <p:cTn id="19" fill="hold">
+                          <p:cTn id="17" fill="hold">
                             <p:stCondLst>
                               <p:cond delay="0"/>
                             </p:stCondLst>
                             <p:childTnLst>
                               <p:par>
-                                <p:cTn id="20" presetID="14" presetClass="exit" presetSubtype="10" fill="hold" grpId="1" nodeType="clickEffect">
+                                <p:cTn id="18" presetID="14" presetClass="exit" presetSubtype="10" fill="hold" grpId="1" nodeType="clickEffect">
                                   <p:stCondLst>
                                     <p:cond delay="0"/>
                                   </p:stCondLst>
                                   <p:childTnLst>
                                     <p:animEffect transition="out" filter="randombar(horizontal)">
                                       <p:cBhvr>
-                                        <p:cTn id="21" dur="1000"/>
+                                        <p:cTn id="19" dur="1000"/>
                                         <p:tgtEl>
                                           <p:spTgt spid="6"/>
                                         </p:tgtEl>
@@ -19637,7 +19387,7 @@
                                     </p:animEffect>
                                     <p:set>
                                       <p:cBhvr>
-                                        <p:cTn id="22" dur="1" fill="hold">
+                                        <p:cTn id="20" dur="1" fill="hold">
                                           <p:stCondLst>
                                             <p:cond delay="999"/>
                                           </p:stCondLst>
@@ -19657,14 +19407,14 @@
                                 </p:cTn>
                               </p:par>
                               <p:par>
-                                <p:cTn id="23" presetID="14" presetClass="exit" presetSubtype="10" fill="hold" nodeType="withEffect">
+                                <p:cTn id="21" presetID="14" presetClass="exit" presetSubtype="10" fill="hold" nodeType="withEffect">
                                   <p:stCondLst>
                                     <p:cond delay="0"/>
                                   </p:stCondLst>
                                   <p:childTnLst>
                                     <p:animEffect transition="out" filter="randombar(horizontal)">
                                       <p:cBhvr>
-                                        <p:cTn id="24" dur="1000"/>
+                                        <p:cTn id="22" dur="1000"/>
                                         <p:tgtEl>
                                           <p:spTgt spid="2"/>
                                         </p:tgtEl>
@@ -19672,7 +19422,7 @@
                                     </p:animEffect>
                                     <p:set>
                                       <p:cBhvr>
-                                        <p:cTn id="25" dur="1" fill="hold">
+                                        <p:cTn id="23" dur="1" fill="hold">
                                           <p:stCondLst>
                                             <p:cond delay="999"/>
                                           </p:stCondLst>
@@ -19692,14 +19442,14 @@
                                 </p:cTn>
                               </p:par>
                               <p:par>
-                                <p:cTn id="26" presetID="14" presetClass="exit" presetSubtype="10" fill="hold" nodeType="withEffect">
+                                <p:cTn id="24" presetID="14" presetClass="exit" presetSubtype="10" fill="hold" nodeType="withEffect">
                                   <p:stCondLst>
                                     <p:cond delay="0"/>
                                   </p:stCondLst>
                                   <p:childTnLst>
                                     <p:animEffect transition="out" filter="randombar(horizontal)">
                                       <p:cBhvr>
-                                        <p:cTn id="27" dur="1000"/>
+                                        <p:cTn id="25" dur="1000"/>
                                         <p:tgtEl>
                                           <p:spTgt spid="3"/>
                                         </p:tgtEl>
@@ -19707,7 +19457,7 @@
                                     </p:animEffect>
                                     <p:set>
                                       <p:cBhvr>
-                                        <p:cTn id="28" dur="1" fill="hold">
+                                        <p:cTn id="26" dur="1" fill="hold">
                                           <p:stCondLst>
                                             <p:cond delay="999"/>
                                           </p:stCondLst>
@@ -19898,7 +19648,7 @@
           <p:cNvPr id="4" name="Title 1">
             <a:extLst>
               <a:ext uri="{FF2B5EF4-FFF2-40B4-BE49-F238E27FC236}">
-                <a16:creationId xmlns:a16="http://schemas.microsoft.com/office/drawing/2014/main" xmlns="" id="{9DE94162-323C-48DA-8B52-07C80BAC06EE}"/>
+                <a16:creationId xmlns="" xmlns:a16="http://schemas.microsoft.com/office/drawing/2014/main" id="{9DE94162-323C-48DA-8B52-07C80BAC06EE}"/>
               </a:ext>
             </a:extLst>
           </p:cNvPr>
@@ -20070,6 +19820,9 @@
                     <p:cTn id="3" fill="hold">
                       <p:stCondLst>
                         <p:cond delay="indefinite"/>
+                        <p:cond evt="onBegin" delay="0">
+                          <p:tn val="2"/>
+                        </p:cond>
                       </p:stCondLst>
                       <p:childTnLst>
                         <p:par>
@@ -20079,7 +19832,7 @@
                             </p:stCondLst>
                             <p:childTnLst>
                               <p:par>
-                                <p:cTn id="5" presetID="2" presetClass="entr" presetSubtype="4" fill="hold" grpId="0" nodeType="clickEffect">
+                                <p:cTn id="5" presetID="2" presetClass="entr" presetSubtype="4" fill="hold" grpId="0" nodeType="withEffect">
                                   <p:stCondLst>
                                     <p:cond delay="0"/>
                                   </p:stCondLst>
@@ -20189,7 +19942,7 @@
                               <p:par>
                                 <p:cTn id="12" presetID="10" presetClass="entr" presetSubtype="0" fill="hold" nodeType="withEffect">
                                   <p:stCondLst>
-                                    <p:cond delay="6000"/>
+                                    <p:cond delay="1500"/>
                                   </p:stCondLst>
                                   <p:childTnLst>
                                     <p:set>
@@ -20516,7 +20269,7 @@
           <p:cNvPr id="4" name="Title 1">
             <a:extLst>
               <a:ext uri="{FF2B5EF4-FFF2-40B4-BE49-F238E27FC236}">
-                <a16:creationId xmlns:a16="http://schemas.microsoft.com/office/drawing/2014/main" xmlns="" id="{9DE94162-323C-48DA-8B52-07C80BAC06EE}"/>
+                <a16:creationId xmlns="" xmlns:a16="http://schemas.microsoft.com/office/drawing/2014/main" id="{9DE94162-323C-48DA-8B52-07C80BAC06EE}"/>
               </a:ext>
             </a:extLst>
           </p:cNvPr>
@@ -20700,6 +20453,9 @@
                     <p:cTn id="3" fill="hold">
                       <p:stCondLst>
                         <p:cond delay="indefinite"/>
+                        <p:cond evt="onBegin" delay="0">
+                          <p:tn val="2"/>
+                        </p:cond>
                       </p:stCondLst>
                       <p:childTnLst>
                         <p:par>
@@ -20709,7 +20465,7 @@
                             </p:stCondLst>
                             <p:childTnLst>
                               <p:par>
-                                <p:cTn id="5" presetID="2" presetClass="entr" presetSubtype="4" fill="hold" grpId="0" nodeType="clickEffect">
+                                <p:cTn id="5" presetID="2" presetClass="entr" presetSubtype="4" fill="hold" grpId="0" nodeType="withEffect">
                                   <p:stCondLst>
                                     <p:cond delay="0"/>
                                   </p:stCondLst>
@@ -20865,7 +20621,7 @@
                               <p:par>
                                 <p:cTn id="14" presetID="42" presetClass="entr" presetSubtype="0" fill="hold" nodeType="withEffect">
                                   <p:stCondLst>
-                                    <p:cond delay="1000"/>
+                                    <p:cond delay="1500"/>
                                   </p:stCondLst>
                                   <p:childTnLst>
                                     <p:set>
@@ -21238,7 +20994,7 @@
           <p:cNvPr id="5" name="Title 1">
             <a:extLst>
               <a:ext uri="{FF2B5EF4-FFF2-40B4-BE49-F238E27FC236}">
-                <a16:creationId xmlns:a16="http://schemas.microsoft.com/office/drawing/2014/main" xmlns="" id="{9DE94162-323C-48DA-8B52-07C80BAC06EE}"/>
+                <a16:creationId xmlns="" xmlns:a16="http://schemas.microsoft.com/office/drawing/2014/main" id="{9DE94162-323C-48DA-8B52-07C80BAC06EE}"/>
               </a:ext>
             </a:extLst>
           </p:cNvPr>
@@ -21479,7 +21235,7 @@
                               <p:par>
                                 <p:cTn id="9" presetID="10" presetClass="entr" presetSubtype="0" fill="hold" nodeType="withEffect">
                                   <p:stCondLst>
-                                    <p:cond delay="0"/>
+                                    <p:cond delay="1000"/>
                                   </p:stCondLst>
                                   <p:childTnLst>
                                     <p:set>
@@ -21514,7 +21270,7 @@
                               <p:par>
                                 <p:cTn id="12" presetID="53" presetClass="entr" presetSubtype="16" fill="hold" nodeType="withEffect">
                                   <p:stCondLst>
-                                    <p:cond delay="5000"/>
+                                    <p:cond delay="1500"/>
                                   </p:stCondLst>
                                   <p:childTnLst>
                                     <p:set>
@@ -21887,7 +21643,7 @@
           <p:cNvPr id="4" name="Title 1">
             <a:extLst>
               <a:ext uri="{FF2B5EF4-FFF2-40B4-BE49-F238E27FC236}">
-                <a16:creationId xmlns:a16="http://schemas.microsoft.com/office/drawing/2014/main" xmlns="" id="{9DE94162-323C-48DA-8B52-07C80BAC06EE}"/>
+                <a16:creationId xmlns="" xmlns:a16="http://schemas.microsoft.com/office/drawing/2014/main" id="{9DE94162-323C-48DA-8B52-07C80BAC06EE}"/>
               </a:ext>
             </a:extLst>
           </p:cNvPr>
@@ -22081,6 +21837,9 @@
                     <p:cTn id="3" fill="hold">
                       <p:stCondLst>
                         <p:cond delay="indefinite"/>
+                        <p:cond evt="onBegin" delay="0">
+                          <p:tn val="2"/>
+                        </p:cond>
                       </p:stCondLst>
                       <p:childTnLst>
                         <p:par>
@@ -22090,7 +21849,7 @@
                             </p:stCondLst>
                             <p:childTnLst>
                               <p:par>
-                                <p:cTn id="5" presetID="2" presetClass="entr" presetSubtype="4" fill="hold" grpId="0" nodeType="clickEffect">
+                                <p:cTn id="5" presetID="2" presetClass="entr" presetSubtype="4" fill="hold" grpId="0" nodeType="withEffect">
                                   <p:stCondLst>
                                     <p:cond delay="0"/>
                                   </p:stCondLst>
@@ -22492,7 +22251,7 @@
           <p:cNvPr id="2" name="Title 1">
             <a:extLst>
               <a:ext uri="{FF2B5EF4-FFF2-40B4-BE49-F238E27FC236}">
-                <a16:creationId xmlns:a16="http://schemas.microsoft.com/office/drawing/2014/main" xmlns="" id="{9DE94162-323C-48DA-8B52-07C80BAC06EE}"/>
+                <a16:creationId xmlns="" xmlns:a16="http://schemas.microsoft.com/office/drawing/2014/main" id="{9DE94162-323C-48DA-8B52-07C80BAC06EE}"/>
               </a:ext>
             </a:extLst>
           </p:cNvPr>
@@ -22806,6 +22565,9 @@
                     <p:cTn id="3" fill="hold">
                       <p:stCondLst>
                         <p:cond delay="indefinite"/>
+                        <p:cond evt="onBegin" delay="0">
+                          <p:tn val="2"/>
+                        </p:cond>
                       </p:stCondLst>
                       <p:childTnLst>
                         <p:par>
@@ -22815,7 +22577,7 @@
                             </p:stCondLst>
                             <p:childTnLst>
                               <p:par>
-                                <p:cTn id="5" presetID="2" presetClass="entr" presetSubtype="4" fill="hold" grpId="0" nodeType="clickEffect">
+                                <p:cTn id="5" presetID="2" presetClass="entr" presetSubtype="4" fill="hold" grpId="0" nodeType="withEffect">
                                   <p:stCondLst>
                                     <p:cond delay="0"/>
                                   </p:stCondLst>
@@ -22890,7 +22652,7 @@
                               <p:par>
                                 <p:cTn id="9" presetID="14" presetClass="entr" presetSubtype="10" fill="hold" nodeType="withEffect">
                                   <p:stCondLst>
-                                    <p:cond delay="0"/>
+                                    <p:cond delay="500"/>
                                   </p:stCondLst>
                                   <p:childTnLst>
                                     <p:set>
@@ -22925,7 +22687,7 @@
                               <p:par>
                                 <p:cTn id="12" presetID="10" presetClass="entr" presetSubtype="0" fill="hold" nodeType="withEffect">
                                   <p:stCondLst>
-                                    <p:cond delay="2000"/>
+                                    <p:cond delay="1000"/>
                                   </p:stCondLst>
                                   <p:childTnLst>
                                     <p:set>
@@ -22960,7 +22722,7 @@
                               <p:par>
                                 <p:cTn id="15" presetID="10" presetClass="entr" presetSubtype="0" fill="hold" nodeType="withEffect">
                                   <p:stCondLst>
-                                    <p:cond delay="2000"/>
+                                    <p:cond delay="1500"/>
                                   </p:stCondLst>
                                   <p:childTnLst>
                                     <p:set>
@@ -22995,7 +22757,7 @@
                               <p:par>
                                 <p:cTn id="18" presetID="10" presetClass="entr" presetSubtype="0" fill="hold" nodeType="withEffect">
                                   <p:stCondLst>
-                                    <p:cond delay="5000"/>
+                                    <p:cond delay="4000"/>
                                   </p:stCondLst>
                                   <p:childTnLst>
                                     <p:set>

</xml_diff>